<commit_message>
Backend added to presentation
</commit_message>
<xml_diff>
--- a/Team 4/PM_Abschlusspräsentation_Team4.pptx
+++ b/Team 4/PM_Abschlusspräsentation_Team4.pptx
@@ -8,10 +8,11 @@
     <p:sldId id="256" r:id="rId2"/>
     <p:sldId id="264" r:id="rId3"/>
     <p:sldId id="263" r:id="rId4"/>
-    <p:sldId id="261" r:id="rId5"/>
-    <p:sldId id="258" r:id="rId6"/>
-    <p:sldId id="259" r:id="rId7"/>
-    <p:sldId id="262" r:id="rId8"/>
+    <p:sldId id="265" r:id="rId5"/>
+    <p:sldId id="261" r:id="rId6"/>
+    <p:sldId id="258" r:id="rId7"/>
+    <p:sldId id="259" r:id="rId8"/>
+    <p:sldId id="262" r:id="rId9"/>
   </p:sldIdLst>
   <p:sldSz cx="12192000" cy="6858000"/>
   <p:notesSz cx="6858000" cy="9144000"/>
@@ -16427,6 +16428,246 @@
       </p:grpSpPr>
       <p:sp>
         <p:nvSpPr>
+          <p:cNvPr id="10" name="Rectangle 9">
+            <a:extLst>
+              <a:ext uri="{FF2B5EF4-FFF2-40B4-BE49-F238E27FC236}">
+                <a16:creationId xmlns:a16="http://schemas.microsoft.com/office/drawing/2014/main" id="{AB45A142-4255-493C-8284-5D566C121B10}"/>
+              </a:ext>
+              <a:ext uri="{C183D7F6-B498-43B3-948B-1728B52AA6E4}">
+                <adec:decorative xmlns:adec="http://schemas.microsoft.com/office/drawing/2017/decorative" val="1"/>
+              </a:ext>
+            </a:extLst>
+          </p:cNvPr>
+          <p:cNvSpPr>
+            <a:spLocks noGrp="1" noRot="1" noChangeAspect="1" noMove="1" noResize="1" noEditPoints="1" noAdjustHandles="1" noChangeArrowheads="1" noChangeShapeType="1" noTextEdit="1"/>
+          </p:cNvSpPr>
+          <p:nvPr>
+            <p:extLst>
+              <p:ext uri="{386F3935-93C4-4BCD-93E2-E3B085C9AB24}">
+                <p16:designElem xmlns:p16="http://schemas.microsoft.com/office/powerpoint/2015/main" val="1"/>
+              </p:ext>
+            </p:extLst>
+          </p:nvPr>
+        </p:nvSpPr>
+        <p:spPr bwMode="ltGray">
+          <a:xfrm>
+            <a:off x="336884" y="321177"/>
+            <a:ext cx="4332307" cy="6179552"/>
+          </a:xfrm>
+          <a:prstGeom prst="rect">
+            <a:avLst/>
+          </a:prstGeom>
+          <a:solidFill>
+            <a:srgbClr val="404040">
+              <a:alpha val="89804"/>
+            </a:srgbClr>
+          </a:solidFill>
+          <a:ln w="127000" cap="sq" cmpd="thinThick">
+            <a:solidFill>
+              <a:srgbClr val="595959">
+                <a:alpha val="80000"/>
+              </a:srgbClr>
+            </a:solidFill>
+          </a:ln>
+        </p:spPr>
+        <p:style>
+          <a:lnRef idx="2">
+            <a:schemeClr val="accent1">
+              <a:shade val="50000"/>
+            </a:schemeClr>
+          </a:lnRef>
+          <a:fillRef idx="1">
+            <a:schemeClr val="accent1"/>
+          </a:fillRef>
+          <a:effectRef idx="0">
+            <a:schemeClr val="accent1"/>
+          </a:effectRef>
+          <a:fontRef idx="minor">
+            <a:schemeClr val="lt1"/>
+          </a:fontRef>
+        </p:style>
+        <p:txBody>
+          <a:bodyPr rtlCol="0" anchor="ctr"/>
+          <a:lstStyle/>
+          <a:p>
+            <a:pPr algn="ctr"/>
+            <a:endParaRPr lang="en-US"/>
+          </a:p>
+        </p:txBody>
+      </p:sp>
+      <p:sp>
+        <p:nvSpPr>
+          <p:cNvPr id="2" name="Titel 1">
+            <a:extLst>
+              <a:ext uri="{FF2B5EF4-FFF2-40B4-BE49-F238E27FC236}">
+                <a16:creationId xmlns:a16="http://schemas.microsoft.com/office/drawing/2014/main" id="{C404AC6D-2C82-4BA8-B681-778ECB7633DC}"/>
+              </a:ext>
+            </a:extLst>
+          </p:cNvPr>
+          <p:cNvSpPr>
+            <a:spLocks noGrp="1"/>
+          </p:cNvSpPr>
+          <p:nvPr>
+            <p:ph type="title"/>
+          </p:nvPr>
+        </p:nvSpPr>
+        <p:spPr>
+          <a:xfrm>
+            <a:off x="674237" y="914400"/>
+            <a:ext cx="3657600" cy="2887579"/>
+          </a:xfrm>
+        </p:spPr>
+        <p:txBody>
+          <a:bodyPr vert="horz" lIns="91440" tIns="45720" rIns="91440" bIns="45720" rtlCol="0" anchor="b">
+            <a:normAutofit/>
+          </a:bodyPr>
+          <a:lstStyle/>
+          <a:p>
+            <a:pPr algn="ctr"/>
+            <a:r>
+              <a:rPr lang="en-US" sz="4800" kern="1200">
+                <a:solidFill>
+                  <a:srgbClr val="FFFFFF"/>
+                </a:solidFill>
+                <a:latin typeface="+mj-lt"/>
+                <a:ea typeface="+mj-ea"/>
+                <a:cs typeface="+mj-cs"/>
+              </a:rPr>
+              <a:t>Backend-Struktur</a:t>
+            </a:r>
+          </a:p>
+        </p:txBody>
+      </p:sp>
+      <p:cxnSp>
+        <p:nvCxnSpPr>
+          <p:cNvPr id="12" name="Straight Connector 11">
+            <a:extLst>
+              <a:ext uri="{FF2B5EF4-FFF2-40B4-BE49-F238E27FC236}">
+                <a16:creationId xmlns:a16="http://schemas.microsoft.com/office/drawing/2014/main" id="{38FB9660-F42F-4313-BBC4-47C007FE484C}"/>
+              </a:ext>
+              <a:ext uri="{C183D7F6-B498-43B3-948B-1728B52AA6E4}">
+                <adec:decorative xmlns:adec="http://schemas.microsoft.com/office/drawing/2017/decorative" val="1"/>
+              </a:ext>
+            </a:extLst>
+          </p:cNvPr>
+          <p:cNvCxnSpPr>
+            <a:cxnSpLocks noGrp="1" noRot="1" noChangeAspect="1" noMove="1" noResize="1" noEditPoints="1" noAdjustHandles="1" noChangeArrowheads="1" noChangeShapeType="1"/>
+          </p:cNvCxnSpPr>
+          <p:nvPr>
+            <p:extLst>
+              <p:ext uri="{386F3935-93C4-4BCD-93E2-E3B085C9AB24}">
+                <p16:designElem xmlns:p16="http://schemas.microsoft.com/office/powerpoint/2015/main" val="1"/>
+              </p:ext>
+            </p:extLst>
+          </p:nvPr>
+        </p:nvCxnSpPr>
+        <p:spPr>
+          <a:xfrm>
+            <a:off x="1191126" y="3910267"/>
+            <a:ext cx="2586790" cy="0"/>
+          </a:xfrm>
+          <a:prstGeom prst="line">
+            <a:avLst/>
+          </a:prstGeom>
+          <a:ln w="22225">
+            <a:solidFill>
+              <a:srgbClr val="D9D9D9"/>
+            </a:solidFill>
+          </a:ln>
+        </p:spPr>
+        <p:style>
+          <a:lnRef idx="1">
+            <a:schemeClr val="accent1"/>
+          </a:lnRef>
+          <a:fillRef idx="0">
+            <a:schemeClr val="accent1"/>
+          </a:fillRef>
+          <a:effectRef idx="0">
+            <a:schemeClr val="accent1"/>
+          </a:effectRef>
+          <a:fontRef idx="minor">
+            <a:schemeClr val="tx1"/>
+          </a:fontRef>
+        </p:style>
+      </p:cxnSp>
+      <p:pic>
+        <p:nvPicPr>
+          <p:cNvPr id="5" name="Inhaltsplatzhalter 4">
+            <a:extLst>
+              <a:ext uri="{FF2B5EF4-FFF2-40B4-BE49-F238E27FC236}">
+                <a16:creationId xmlns:a16="http://schemas.microsoft.com/office/drawing/2014/main" id="{C40D8242-2498-467E-9111-4227F23CEE1B}"/>
+              </a:ext>
+            </a:extLst>
+          </p:cNvPr>
+          <p:cNvPicPr>
+            <a:picLocks noGrp="1" noChangeAspect="1"/>
+          </p:cNvPicPr>
+          <p:nvPr>
+            <p:ph idx="1"/>
+          </p:nvPr>
+        </p:nvPicPr>
+        <p:blipFill>
+          <a:blip r:embed="rId2">
+            <a:extLst>
+              <a:ext uri="{28A0092B-C50C-407E-A947-70E740481C1C}">
+                <a14:useLocalDpi xmlns:a14="http://schemas.microsoft.com/office/drawing/2010/main" val="0"/>
+              </a:ext>
+            </a:extLst>
+          </a:blip>
+          <a:stretch>
+            <a:fillRect/>
+          </a:stretch>
+        </p:blipFill>
+        <p:spPr>
+          <a:xfrm>
+            <a:off x="5600461" y="492573"/>
+            <a:ext cx="5660266" cy="5880796"/>
+          </a:xfrm>
+          <a:prstGeom prst="rect">
+            <a:avLst/>
+          </a:prstGeom>
+        </p:spPr>
+      </p:pic>
+    </p:spTree>
+    <p:extLst>
+      <p:ext uri="{BB962C8B-B14F-4D97-AF65-F5344CB8AC3E}">
+        <p14:creationId xmlns:p14="http://schemas.microsoft.com/office/powerpoint/2010/main" val="1312954955"/>
+      </p:ext>
+    </p:extLst>
+  </p:cSld>
+  <p:clrMapOvr>
+    <a:masterClrMapping/>
+  </p:clrMapOvr>
+</p:sld>
+</file>
+
+<file path=ppt/slides/slide5.xml><?xml version="1.0" encoding="utf-8"?>
+<p:sld xmlns:a="http://schemas.openxmlformats.org/drawingml/2006/main" xmlns:r="http://schemas.openxmlformats.org/officeDocument/2006/relationships" xmlns:p="http://schemas.openxmlformats.org/presentationml/2006/main">
+  <p:cSld>
+    <p:bg>
+      <p:bgPr>
+        <a:solidFill>
+          <a:schemeClr val="bg1"/>
+        </a:solidFill>
+        <a:effectLst/>
+      </p:bgPr>
+    </p:bg>
+    <p:spTree>
+      <p:nvGrpSpPr>
+        <p:cNvPr id="1" name=""/>
+        <p:cNvGrpSpPr/>
+        <p:nvPr/>
+      </p:nvGrpSpPr>
+      <p:grpSpPr>
+        <a:xfrm>
+          <a:off x="0" y="0"/>
+          <a:ext cx="0" cy="0"/>
+          <a:chOff x="0" y="0"/>
+          <a:chExt cx="0" cy="0"/>
+        </a:xfrm>
+      </p:grpSpPr>
+      <p:sp>
+        <p:nvSpPr>
           <p:cNvPr id="10" name="Freeform: Shape 9">
             <a:extLst>
               <a:ext uri="{FF2B5EF4-FFF2-40B4-BE49-F238E27FC236}">
@@ -16989,7 +17230,7 @@
 </p:sld>
 </file>
 
-<file path=ppt/slides/slide5.xml><?xml version="1.0" encoding="utf-8"?>
+<file path=ppt/slides/slide6.xml><?xml version="1.0" encoding="utf-8"?>
 <p:sld xmlns:a="http://schemas.openxmlformats.org/drawingml/2006/main" xmlns:r="http://schemas.openxmlformats.org/officeDocument/2006/relationships" xmlns:p="http://schemas.openxmlformats.org/presentationml/2006/main">
   <p:cSld>
     <p:bg>
@@ -17248,7 +17489,7 @@
 </p:sld>
 </file>
 
-<file path=ppt/slides/slide6.xml><?xml version="1.0" encoding="utf-8"?>
+<file path=ppt/slides/slide7.xml><?xml version="1.0" encoding="utf-8"?>
 <p:sld xmlns:a="http://schemas.openxmlformats.org/drawingml/2006/main" xmlns:r="http://schemas.openxmlformats.org/officeDocument/2006/relationships" xmlns:p="http://schemas.openxmlformats.org/presentationml/2006/main">
   <p:cSld>
     <p:bg>
@@ -17837,7 +18078,7 @@
 </p:sld>
 </file>
 
-<file path=ppt/slides/slide7.xml><?xml version="1.0" encoding="utf-8"?>
+<file path=ppt/slides/slide8.xml><?xml version="1.0" encoding="utf-8"?>
 <p:sld xmlns:a="http://schemas.openxmlformats.org/drawingml/2006/main" xmlns:r="http://schemas.openxmlformats.org/officeDocument/2006/relationships" xmlns:p="http://schemas.openxmlformats.org/presentationml/2006/main">
   <p:cSld>
     <p:bg>

</xml_diff>

<commit_message>
Add Backend slides to Team4 presentation
</commit_message>
<xml_diff>
--- a/Team 4/PM_Abschlusspräsentation_Team4.pptx
+++ b/Team 4/PM_Abschlusspräsentation_Team4.pptx
@@ -8,11 +8,14 @@
     <p:sldId id="256" r:id="rId2"/>
     <p:sldId id="264" r:id="rId3"/>
     <p:sldId id="263" r:id="rId4"/>
-    <p:sldId id="265" r:id="rId5"/>
-    <p:sldId id="261" r:id="rId6"/>
-    <p:sldId id="258" r:id="rId7"/>
-    <p:sldId id="259" r:id="rId8"/>
-    <p:sldId id="262" r:id="rId9"/>
+    <p:sldId id="267" r:id="rId5"/>
+    <p:sldId id="265" r:id="rId6"/>
+    <p:sldId id="269" r:id="rId7"/>
+    <p:sldId id="271" r:id="rId8"/>
+    <p:sldId id="261" r:id="rId9"/>
+    <p:sldId id="258" r:id="rId10"/>
+    <p:sldId id="259" r:id="rId11"/>
+    <p:sldId id="262" r:id="rId12"/>
   </p:sldIdLst>
   <p:sldSz cx="12192000" cy="6858000"/>
   <p:notesSz cx="6858000" cy="9144000"/>
@@ -15223,6 +15226,983 @@
 </p:sld>
 </file>
 
+<file path=ppt/slides/slide10.xml><?xml version="1.0" encoding="utf-8"?>
+<p:sld xmlns:a="http://schemas.openxmlformats.org/drawingml/2006/main" xmlns:r="http://schemas.openxmlformats.org/officeDocument/2006/relationships" xmlns:p="http://schemas.openxmlformats.org/presentationml/2006/main">
+  <p:cSld>
+    <p:bg>
+      <p:bgPr>
+        <a:solidFill>
+          <a:schemeClr val="bg1"/>
+        </a:solidFill>
+        <a:effectLst/>
+      </p:bgPr>
+    </p:bg>
+    <p:spTree>
+      <p:nvGrpSpPr>
+        <p:cNvPr id="1" name=""/>
+        <p:cNvGrpSpPr/>
+        <p:nvPr/>
+      </p:nvGrpSpPr>
+      <p:grpSpPr>
+        <a:xfrm>
+          <a:off x="0" y="0"/>
+          <a:ext cx="0" cy="0"/>
+          <a:chOff x="0" y="0"/>
+          <a:chExt cx="0" cy="0"/>
+        </a:xfrm>
+      </p:grpSpPr>
+      <p:sp>
+        <p:nvSpPr>
+          <p:cNvPr id="14" name="Freeform: Shape 9">
+            <a:extLst>
+              <a:ext uri="{FF2B5EF4-FFF2-40B4-BE49-F238E27FC236}">
+                <a16:creationId xmlns:a16="http://schemas.microsoft.com/office/drawing/2014/main" id="{46C2E80F-49A6-4372-B103-219D417A55ED}"/>
+              </a:ext>
+              <a:ext uri="{C183D7F6-B498-43B3-948B-1728B52AA6E4}">
+                <adec:decorative xmlns:adec="http://schemas.microsoft.com/office/drawing/2017/decorative" val="1"/>
+              </a:ext>
+            </a:extLst>
+          </p:cNvPr>
+          <p:cNvSpPr>
+            <a:spLocks noGrp="1" noRot="1" noChangeAspect="1" noMove="1" noResize="1" noEditPoints="1" noAdjustHandles="1" noChangeArrowheads="1" noChangeShapeType="1" noTextEdit="1"/>
+          </p:cNvSpPr>
+          <p:nvPr>
+            <p:extLst>
+              <p:ext uri="{386F3935-93C4-4BCD-93E2-E3B085C9AB24}">
+                <p16:designElem xmlns:p16="http://schemas.microsoft.com/office/powerpoint/2015/main" val="1"/>
+              </p:ext>
+            </p:extLst>
+          </p:nvPr>
+        </p:nvSpPr>
+        <p:spPr>
+          <a:xfrm>
+            <a:off x="484096" y="470925"/>
+            <a:ext cx="4381009" cy="5892104"/>
+          </a:xfrm>
+          <a:custGeom>
+            <a:avLst/>
+            <a:gdLst>
+              <a:gd name="connsiteX0" fmla="*/ 0 w 4381009"/>
+              <a:gd name="connsiteY0" fmla="*/ 0 h 5892104"/>
+              <a:gd name="connsiteX1" fmla="*/ 4157628 w 4381009"/>
+              <a:gd name="connsiteY1" fmla="*/ 0 h 5892104"/>
+              <a:gd name="connsiteX2" fmla="*/ 4169302 w 4381009"/>
+              <a:gd name="connsiteY2" fmla="*/ 68659 h 5892104"/>
+              <a:gd name="connsiteX3" fmla="*/ 4191571 w 4381009"/>
+              <a:gd name="connsiteY3" fmla="*/ 205472 h 5892104"/>
+              <a:gd name="connsiteX4" fmla="*/ 4213368 w 4381009"/>
+              <a:gd name="connsiteY4" fmla="*/ 342890 h 5892104"/>
+              <a:gd name="connsiteX5" fmla="*/ 4232030 w 4381009"/>
+              <a:gd name="connsiteY5" fmla="*/ 480913 h 5892104"/>
+              <a:gd name="connsiteX6" fmla="*/ 4250848 w 4381009"/>
+              <a:gd name="connsiteY6" fmla="*/ 618332 h 5892104"/>
+              <a:gd name="connsiteX7" fmla="*/ 4268412 w 4381009"/>
+              <a:gd name="connsiteY7" fmla="*/ 756355 h 5892104"/>
+              <a:gd name="connsiteX8" fmla="*/ 4283467 w 4381009"/>
+              <a:gd name="connsiteY8" fmla="*/ 892563 h 5892104"/>
+              <a:gd name="connsiteX9" fmla="*/ 4297737 w 4381009"/>
+              <a:gd name="connsiteY9" fmla="*/ 1030587 h 5892104"/>
+              <a:gd name="connsiteX10" fmla="*/ 4310754 w 4381009"/>
+              <a:gd name="connsiteY10" fmla="*/ 1168005 h 5892104"/>
+              <a:gd name="connsiteX11" fmla="*/ 4322045 w 4381009"/>
+              <a:gd name="connsiteY11" fmla="*/ 1303002 h 5892104"/>
+              <a:gd name="connsiteX12" fmla="*/ 4333336 w 4381009"/>
+              <a:gd name="connsiteY12" fmla="*/ 1439815 h 5892104"/>
+              <a:gd name="connsiteX13" fmla="*/ 4342745 w 4381009"/>
+              <a:gd name="connsiteY13" fmla="*/ 1574812 h 5892104"/>
+              <a:gd name="connsiteX14" fmla="*/ 4350115 w 4381009"/>
+              <a:gd name="connsiteY14" fmla="*/ 1709808 h 5892104"/>
+              <a:gd name="connsiteX15" fmla="*/ 4357799 w 4381009"/>
+              <a:gd name="connsiteY15" fmla="*/ 1844200 h 5892104"/>
+              <a:gd name="connsiteX16" fmla="*/ 4364229 w 4381009"/>
+              <a:gd name="connsiteY16" fmla="*/ 1977381 h 5892104"/>
+              <a:gd name="connsiteX17" fmla="*/ 4368777 w 4381009"/>
+              <a:gd name="connsiteY17" fmla="*/ 2109351 h 5892104"/>
+              <a:gd name="connsiteX18" fmla="*/ 4372697 w 4381009"/>
+              <a:gd name="connsiteY18" fmla="*/ 2241321 h 5892104"/>
+              <a:gd name="connsiteX19" fmla="*/ 4376461 w 4381009"/>
+              <a:gd name="connsiteY19" fmla="*/ 2372080 h 5892104"/>
+              <a:gd name="connsiteX20" fmla="*/ 4378186 w 4381009"/>
+              <a:gd name="connsiteY20" fmla="*/ 2501023 h 5892104"/>
+              <a:gd name="connsiteX21" fmla="*/ 4380068 w 4381009"/>
+              <a:gd name="connsiteY21" fmla="*/ 2629966 h 5892104"/>
+              <a:gd name="connsiteX22" fmla="*/ 4381009 w 4381009"/>
+              <a:gd name="connsiteY22" fmla="*/ 2757093 h 5892104"/>
+              <a:gd name="connsiteX23" fmla="*/ 4380068 w 4381009"/>
+              <a:gd name="connsiteY23" fmla="*/ 2883010 h 5892104"/>
+              <a:gd name="connsiteX24" fmla="*/ 4380068 w 4381009"/>
+              <a:gd name="connsiteY24" fmla="*/ 3007715 h 5892104"/>
+              <a:gd name="connsiteX25" fmla="*/ 4378186 w 4381009"/>
+              <a:gd name="connsiteY25" fmla="*/ 3131210 h 5892104"/>
+              <a:gd name="connsiteX26" fmla="*/ 4375363 w 4381009"/>
+              <a:gd name="connsiteY26" fmla="*/ 3252283 h 5892104"/>
+              <a:gd name="connsiteX27" fmla="*/ 4372697 w 4381009"/>
+              <a:gd name="connsiteY27" fmla="*/ 3372146 h 5892104"/>
+              <a:gd name="connsiteX28" fmla="*/ 4369718 w 4381009"/>
+              <a:gd name="connsiteY28" fmla="*/ 3489587 h 5892104"/>
+              <a:gd name="connsiteX29" fmla="*/ 4365170 w 4381009"/>
+              <a:gd name="connsiteY29" fmla="*/ 3606423 h 5892104"/>
+              <a:gd name="connsiteX30" fmla="*/ 4360309 w 4381009"/>
+              <a:gd name="connsiteY30" fmla="*/ 3721443 h 5892104"/>
+              <a:gd name="connsiteX31" fmla="*/ 4355918 w 4381009"/>
+              <a:gd name="connsiteY31" fmla="*/ 3834041 h 5892104"/>
+              <a:gd name="connsiteX32" fmla="*/ 4343529 w 4381009"/>
+              <a:gd name="connsiteY32" fmla="*/ 4053789 h 5892104"/>
+              <a:gd name="connsiteX33" fmla="*/ 4330356 w 4381009"/>
+              <a:gd name="connsiteY33" fmla="*/ 4264457 h 5892104"/>
+              <a:gd name="connsiteX34" fmla="*/ 4316556 w 4381009"/>
+              <a:gd name="connsiteY34" fmla="*/ 4466650 h 5892104"/>
+              <a:gd name="connsiteX35" fmla="*/ 4301344 w 4381009"/>
+              <a:gd name="connsiteY35" fmla="*/ 4657946 h 5892104"/>
+              <a:gd name="connsiteX36" fmla="*/ 4285506 w 4381009"/>
+              <a:gd name="connsiteY36" fmla="*/ 4840767 h 5892104"/>
+              <a:gd name="connsiteX37" fmla="*/ 4268412 w 4381009"/>
+              <a:gd name="connsiteY37" fmla="*/ 5010269 h 5892104"/>
+              <a:gd name="connsiteX38" fmla="*/ 4251633 w 4381009"/>
+              <a:gd name="connsiteY38" fmla="*/ 5169481 h 5892104"/>
+              <a:gd name="connsiteX39" fmla="*/ 4234853 w 4381009"/>
+              <a:gd name="connsiteY39" fmla="*/ 5315980 h 5892104"/>
+              <a:gd name="connsiteX40" fmla="*/ 4219014 w 4381009"/>
+              <a:gd name="connsiteY40" fmla="*/ 5450371 h 5892104"/>
+              <a:gd name="connsiteX41" fmla="*/ 4203959 w 4381009"/>
+              <a:gd name="connsiteY41" fmla="*/ 5569628 h 5892104"/>
+              <a:gd name="connsiteX42" fmla="*/ 4189689 w 4381009"/>
+              <a:gd name="connsiteY42" fmla="*/ 5677384 h 5892104"/>
+              <a:gd name="connsiteX43" fmla="*/ 4177770 w 4381009"/>
+              <a:gd name="connsiteY43" fmla="*/ 5768189 h 5892104"/>
+              <a:gd name="connsiteX44" fmla="*/ 4166479 w 4381009"/>
+              <a:gd name="connsiteY44" fmla="*/ 5844465 h 5892104"/>
+              <a:gd name="connsiteX45" fmla="*/ 4159132 w 4381009"/>
+              <a:gd name="connsiteY45" fmla="*/ 5892104 h 5892104"/>
+              <a:gd name="connsiteX46" fmla="*/ 0 w 4381009"/>
+              <a:gd name="connsiteY46" fmla="*/ 5892104 h 5892104"/>
+            </a:gdLst>
+            <a:ahLst/>
+            <a:cxnLst>
+              <a:cxn ang="0">
+                <a:pos x="connsiteX0" y="connsiteY0"/>
+              </a:cxn>
+              <a:cxn ang="0">
+                <a:pos x="connsiteX1" y="connsiteY1"/>
+              </a:cxn>
+              <a:cxn ang="0">
+                <a:pos x="connsiteX2" y="connsiteY2"/>
+              </a:cxn>
+              <a:cxn ang="0">
+                <a:pos x="connsiteX3" y="connsiteY3"/>
+              </a:cxn>
+              <a:cxn ang="0">
+                <a:pos x="connsiteX4" y="connsiteY4"/>
+              </a:cxn>
+              <a:cxn ang="0">
+                <a:pos x="connsiteX5" y="connsiteY5"/>
+              </a:cxn>
+              <a:cxn ang="0">
+                <a:pos x="connsiteX6" y="connsiteY6"/>
+              </a:cxn>
+              <a:cxn ang="0">
+                <a:pos x="connsiteX7" y="connsiteY7"/>
+              </a:cxn>
+              <a:cxn ang="0">
+                <a:pos x="connsiteX8" y="connsiteY8"/>
+              </a:cxn>
+              <a:cxn ang="0">
+                <a:pos x="connsiteX9" y="connsiteY9"/>
+              </a:cxn>
+              <a:cxn ang="0">
+                <a:pos x="connsiteX10" y="connsiteY10"/>
+              </a:cxn>
+              <a:cxn ang="0">
+                <a:pos x="connsiteX11" y="connsiteY11"/>
+              </a:cxn>
+              <a:cxn ang="0">
+                <a:pos x="connsiteX12" y="connsiteY12"/>
+              </a:cxn>
+              <a:cxn ang="0">
+                <a:pos x="connsiteX13" y="connsiteY13"/>
+              </a:cxn>
+              <a:cxn ang="0">
+                <a:pos x="connsiteX14" y="connsiteY14"/>
+              </a:cxn>
+              <a:cxn ang="0">
+                <a:pos x="connsiteX15" y="connsiteY15"/>
+              </a:cxn>
+              <a:cxn ang="0">
+                <a:pos x="connsiteX16" y="connsiteY16"/>
+              </a:cxn>
+              <a:cxn ang="0">
+                <a:pos x="connsiteX17" y="connsiteY17"/>
+              </a:cxn>
+              <a:cxn ang="0">
+                <a:pos x="connsiteX18" y="connsiteY18"/>
+              </a:cxn>
+              <a:cxn ang="0">
+                <a:pos x="connsiteX19" y="connsiteY19"/>
+              </a:cxn>
+              <a:cxn ang="0">
+                <a:pos x="connsiteX20" y="connsiteY20"/>
+              </a:cxn>
+              <a:cxn ang="0">
+                <a:pos x="connsiteX21" y="connsiteY21"/>
+              </a:cxn>
+              <a:cxn ang="0">
+                <a:pos x="connsiteX22" y="connsiteY22"/>
+              </a:cxn>
+              <a:cxn ang="0">
+                <a:pos x="connsiteX23" y="connsiteY23"/>
+              </a:cxn>
+              <a:cxn ang="0">
+                <a:pos x="connsiteX24" y="connsiteY24"/>
+              </a:cxn>
+              <a:cxn ang="0">
+                <a:pos x="connsiteX25" y="connsiteY25"/>
+              </a:cxn>
+              <a:cxn ang="0">
+                <a:pos x="connsiteX26" y="connsiteY26"/>
+              </a:cxn>
+              <a:cxn ang="0">
+                <a:pos x="connsiteX27" y="connsiteY27"/>
+              </a:cxn>
+              <a:cxn ang="0">
+                <a:pos x="connsiteX28" y="connsiteY28"/>
+              </a:cxn>
+              <a:cxn ang="0">
+                <a:pos x="connsiteX29" y="connsiteY29"/>
+              </a:cxn>
+              <a:cxn ang="0">
+                <a:pos x="connsiteX30" y="connsiteY30"/>
+              </a:cxn>
+              <a:cxn ang="0">
+                <a:pos x="connsiteX31" y="connsiteY31"/>
+              </a:cxn>
+              <a:cxn ang="0">
+                <a:pos x="connsiteX32" y="connsiteY32"/>
+              </a:cxn>
+              <a:cxn ang="0">
+                <a:pos x="connsiteX33" y="connsiteY33"/>
+              </a:cxn>
+              <a:cxn ang="0">
+                <a:pos x="connsiteX34" y="connsiteY34"/>
+              </a:cxn>
+              <a:cxn ang="0">
+                <a:pos x="connsiteX35" y="connsiteY35"/>
+              </a:cxn>
+              <a:cxn ang="0">
+                <a:pos x="connsiteX36" y="connsiteY36"/>
+              </a:cxn>
+              <a:cxn ang="0">
+                <a:pos x="connsiteX37" y="connsiteY37"/>
+              </a:cxn>
+              <a:cxn ang="0">
+                <a:pos x="connsiteX38" y="connsiteY38"/>
+              </a:cxn>
+              <a:cxn ang="0">
+                <a:pos x="connsiteX39" y="connsiteY39"/>
+              </a:cxn>
+              <a:cxn ang="0">
+                <a:pos x="connsiteX40" y="connsiteY40"/>
+              </a:cxn>
+              <a:cxn ang="0">
+                <a:pos x="connsiteX41" y="connsiteY41"/>
+              </a:cxn>
+              <a:cxn ang="0">
+                <a:pos x="connsiteX42" y="connsiteY42"/>
+              </a:cxn>
+              <a:cxn ang="0">
+                <a:pos x="connsiteX43" y="connsiteY43"/>
+              </a:cxn>
+              <a:cxn ang="0">
+                <a:pos x="connsiteX44" y="connsiteY44"/>
+              </a:cxn>
+              <a:cxn ang="0">
+                <a:pos x="connsiteX45" y="connsiteY45"/>
+              </a:cxn>
+              <a:cxn ang="0">
+                <a:pos x="connsiteX46" y="connsiteY46"/>
+              </a:cxn>
+            </a:cxnLst>
+            <a:rect l="l" t="t" r="r" b="b"/>
+            <a:pathLst>
+              <a:path w="4381009" h="5892104">
+                <a:moveTo>
+                  <a:pt x="0" y="0"/>
+                </a:moveTo>
+                <a:lnTo>
+                  <a:pt x="4157628" y="0"/>
+                </a:lnTo>
+                <a:lnTo>
+                  <a:pt x="4169302" y="68659"/>
+                </a:lnTo>
+                <a:lnTo>
+                  <a:pt x="4191571" y="205472"/>
+                </a:lnTo>
+                <a:lnTo>
+                  <a:pt x="4213368" y="342890"/>
+                </a:lnTo>
+                <a:lnTo>
+                  <a:pt x="4232030" y="480913"/>
+                </a:lnTo>
+                <a:lnTo>
+                  <a:pt x="4250848" y="618332"/>
+                </a:lnTo>
+                <a:lnTo>
+                  <a:pt x="4268412" y="756355"/>
+                </a:lnTo>
+                <a:lnTo>
+                  <a:pt x="4283467" y="892563"/>
+                </a:lnTo>
+                <a:lnTo>
+                  <a:pt x="4297737" y="1030587"/>
+                </a:lnTo>
+                <a:lnTo>
+                  <a:pt x="4310754" y="1168005"/>
+                </a:lnTo>
+                <a:lnTo>
+                  <a:pt x="4322045" y="1303002"/>
+                </a:lnTo>
+                <a:lnTo>
+                  <a:pt x="4333336" y="1439815"/>
+                </a:lnTo>
+                <a:lnTo>
+                  <a:pt x="4342745" y="1574812"/>
+                </a:lnTo>
+                <a:lnTo>
+                  <a:pt x="4350115" y="1709808"/>
+                </a:lnTo>
+                <a:lnTo>
+                  <a:pt x="4357799" y="1844200"/>
+                </a:lnTo>
+                <a:lnTo>
+                  <a:pt x="4364229" y="1977381"/>
+                </a:lnTo>
+                <a:lnTo>
+                  <a:pt x="4368777" y="2109351"/>
+                </a:lnTo>
+                <a:lnTo>
+                  <a:pt x="4372697" y="2241321"/>
+                </a:lnTo>
+                <a:lnTo>
+                  <a:pt x="4376461" y="2372080"/>
+                </a:lnTo>
+                <a:lnTo>
+                  <a:pt x="4378186" y="2501023"/>
+                </a:lnTo>
+                <a:lnTo>
+                  <a:pt x="4380068" y="2629966"/>
+                </a:lnTo>
+                <a:lnTo>
+                  <a:pt x="4381009" y="2757093"/>
+                </a:lnTo>
+                <a:lnTo>
+                  <a:pt x="4380068" y="2883010"/>
+                </a:lnTo>
+                <a:lnTo>
+                  <a:pt x="4380068" y="3007715"/>
+                </a:lnTo>
+                <a:lnTo>
+                  <a:pt x="4378186" y="3131210"/>
+                </a:lnTo>
+                <a:lnTo>
+                  <a:pt x="4375363" y="3252283"/>
+                </a:lnTo>
+                <a:lnTo>
+                  <a:pt x="4372697" y="3372146"/>
+                </a:lnTo>
+                <a:lnTo>
+                  <a:pt x="4369718" y="3489587"/>
+                </a:lnTo>
+                <a:lnTo>
+                  <a:pt x="4365170" y="3606423"/>
+                </a:lnTo>
+                <a:lnTo>
+                  <a:pt x="4360309" y="3721443"/>
+                </a:lnTo>
+                <a:lnTo>
+                  <a:pt x="4355918" y="3834041"/>
+                </a:lnTo>
+                <a:lnTo>
+                  <a:pt x="4343529" y="4053789"/>
+                </a:lnTo>
+                <a:lnTo>
+                  <a:pt x="4330356" y="4264457"/>
+                </a:lnTo>
+                <a:lnTo>
+                  <a:pt x="4316556" y="4466650"/>
+                </a:lnTo>
+                <a:lnTo>
+                  <a:pt x="4301344" y="4657946"/>
+                </a:lnTo>
+                <a:lnTo>
+                  <a:pt x="4285506" y="4840767"/>
+                </a:lnTo>
+                <a:lnTo>
+                  <a:pt x="4268412" y="5010269"/>
+                </a:lnTo>
+                <a:lnTo>
+                  <a:pt x="4251633" y="5169481"/>
+                </a:lnTo>
+                <a:lnTo>
+                  <a:pt x="4234853" y="5315980"/>
+                </a:lnTo>
+                <a:lnTo>
+                  <a:pt x="4219014" y="5450371"/>
+                </a:lnTo>
+                <a:lnTo>
+                  <a:pt x="4203959" y="5569628"/>
+                </a:lnTo>
+                <a:lnTo>
+                  <a:pt x="4189689" y="5677384"/>
+                </a:lnTo>
+                <a:lnTo>
+                  <a:pt x="4177770" y="5768189"/>
+                </a:lnTo>
+                <a:lnTo>
+                  <a:pt x="4166479" y="5844465"/>
+                </a:lnTo>
+                <a:lnTo>
+                  <a:pt x="4159132" y="5892104"/>
+                </a:lnTo>
+                <a:lnTo>
+                  <a:pt x="0" y="5892104"/>
+                </a:lnTo>
+                <a:close/>
+              </a:path>
+            </a:pathLst>
+          </a:custGeom>
+          <a:solidFill>
+            <a:srgbClr val="404040"/>
+          </a:solidFill>
+          <a:ln>
+            <a:noFill/>
+          </a:ln>
+        </p:spPr>
+        <p:style>
+          <a:lnRef idx="2">
+            <a:schemeClr val="accent1">
+              <a:shade val="50000"/>
+            </a:schemeClr>
+          </a:lnRef>
+          <a:fillRef idx="1">
+            <a:schemeClr val="accent1"/>
+          </a:fillRef>
+          <a:effectRef idx="0">
+            <a:schemeClr val="accent1"/>
+          </a:effectRef>
+          <a:fontRef idx="minor">
+            <a:schemeClr val="lt1"/>
+          </a:fontRef>
+        </p:style>
+        <p:txBody>
+          <a:bodyPr wrap="square" rtlCol="0" anchor="ctr">
+            <a:noAutofit/>
+          </a:bodyPr>
+          <a:lstStyle/>
+          <a:p>
+            <a:pPr marL="0" marR="0" lvl="0" indent="0" algn="ctr" defTabSz="457200" rtl="0" eaLnBrk="1" fontAlgn="auto" latinLnBrk="0" hangingPunct="1">
+              <a:lnSpc>
+                <a:spcPct val="100000"/>
+              </a:lnSpc>
+              <a:spcBef>
+                <a:spcPts val="0"/>
+              </a:spcBef>
+              <a:spcAft>
+                <a:spcPts val="0"/>
+              </a:spcAft>
+              <a:buClrTx/>
+              <a:buSzTx/>
+              <a:buFontTx/>
+              <a:buNone/>
+              <a:tabLst/>
+              <a:defRPr/>
+            </a:pPr>
+            <a:endParaRPr kumimoji="0" lang="en-US" sz="1800" b="0" i="0" u="none" strike="noStrike" kern="1200" cap="none" spc="0" normalizeH="0" baseline="0" noProof="0">
+              <a:ln>
+                <a:noFill/>
+              </a:ln>
+              <a:solidFill>
+                <a:prstClr val="white"/>
+              </a:solidFill>
+              <a:effectLst/>
+              <a:uLnTx/>
+              <a:uFillTx/>
+              <a:latin typeface="Calibri" panose="020F0502020204030204"/>
+              <a:ea typeface="+mn-ea"/>
+              <a:cs typeface="+mn-cs"/>
+            </a:endParaRPr>
+          </a:p>
+        </p:txBody>
+      </p:sp>
+      <p:sp>
+        <p:nvSpPr>
+          <p:cNvPr id="2" name="Titel 1">
+            <a:extLst>
+              <a:ext uri="{FF2B5EF4-FFF2-40B4-BE49-F238E27FC236}">
+                <a16:creationId xmlns:a16="http://schemas.microsoft.com/office/drawing/2014/main" id="{80747543-2235-43C6-9481-9128DD1CA507}"/>
+              </a:ext>
+            </a:extLst>
+          </p:cNvPr>
+          <p:cNvSpPr>
+            <a:spLocks noGrp="1"/>
+          </p:cNvSpPr>
+          <p:nvPr>
+            <p:ph type="title"/>
+          </p:nvPr>
+        </p:nvSpPr>
+        <p:spPr>
+          <a:xfrm>
+            <a:off x="863029" y="1012004"/>
+            <a:ext cx="3416158" cy="4795408"/>
+          </a:xfrm>
+        </p:spPr>
+        <p:txBody>
+          <a:bodyPr>
+            <a:normAutofit/>
+          </a:bodyPr>
+          <a:lstStyle/>
+          <a:p>
+            <a:r>
+              <a:rPr lang="de-DE">
+                <a:solidFill>
+                  <a:srgbClr val="FFFFFF"/>
+                </a:solidFill>
+              </a:rPr>
+              <a:t>Reflexion</a:t>
+            </a:r>
+          </a:p>
+        </p:txBody>
+      </p:sp>
+      <p:graphicFrame>
+        <p:nvGraphicFramePr>
+          <p:cNvPr id="5" name="Inhaltsplatzhalter 2">
+            <a:extLst>
+              <a:ext uri="{FF2B5EF4-FFF2-40B4-BE49-F238E27FC236}">
+                <a16:creationId xmlns:a16="http://schemas.microsoft.com/office/drawing/2014/main" id="{C5826FEA-AF69-4E04-8470-9CD18D791994}"/>
+              </a:ext>
+            </a:extLst>
+          </p:cNvPr>
+          <p:cNvGraphicFramePr>
+            <a:graphicFrameLocks noGrp="1"/>
+          </p:cNvGraphicFramePr>
+          <p:nvPr>
+            <p:ph idx="1"/>
+            <p:extLst>
+              <p:ext uri="{D42A27DB-BD31-4B8C-83A1-F6EECF244321}">
+                <p14:modId xmlns:p14="http://schemas.microsoft.com/office/powerpoint/2010/main" val="2924052128"/>
+              </p:ext>
+            </p:extLst>
+          </p:nvPr>
+        </p:nvGraphicFramePr>
+        <p:xfrm>
+          <a:off x="5194300" y="470924"/>
+          <a:ext cx="6513604" cy="5885426"/>
+        </p:xfrm>
+        <a:graphic>
+          <a:graphicData uri="http://schemas.openxmlformats.org/drawingml/2006/diagram">
+            <dgm:relIds xmlns:dgm="http://schemas.openxmlformats.org/drawingml/2006/diagram" xmlns:r="http://schemas.openxmlformats.org/officeDocument/2006/relationships" r:dm="rId2" r:lo="rId3" r:qs="rId4" r:cs="rId5"/>
+          </a:graphicData>
+        </a:graphic>
+      </p:graphicFrame>
+    </p:spTree>
+    <p:extLst>
+      <p:ext uri="{BB962C8B-B14F-4D97-AF65-F5344CB8AC3E}">
+        <p14:creationId xmlns:p14="http://schemas.microsoft.com/office/powerpoint/2010/main" val="511304633"/>
+      </p:ext>
+    </p:extLst>
+  </p:cSld>
+  <p:clrMapOvr>
+    <a:masterClrMapping/>
+  </p:clrMapOvr>
+</p:sld>
+</file>
+
+<file path=ppt/slides/slide11.xml><?xml version="1.0" encoding="utf-8"?>
+<p:sld xmlns:a="http://schemas.openxmlformats.org/drawingml/2006/main" xmlns:r="http://schemas.openxmlformats.org/officeDocument/2006/relationships" xmlns:p="http://schemas.openxmlformats.org/presentationml/2006/main">
+  <p:cSld>
+    <p:bg>
+      <p:bgPr>
+        <a:solidFill>
+          <a:schemeClr val="bg1"/>
+        </a:solidFill>
+        <a:effectLst/>
+      </p:bgPr>
+    </p:bg>
+    <p:spTree>
+      <p:nvGrpSpPr>
+        <p:cNvPr id="1" name=""/>
+        <p:cNvGrpSpPr/>
+        <p:nvPr/>
+      </p:nvGrpSpPr>
+      <p:grpSpPr>
+        <a:xfrm>
+          <a:off x="0" y="0"/>
+          <a:ext cx="0" cy="0"/>
+          <a:chOff x="0" y="0"/>
+          <a:chExt cx="0" cy="0"/>
+        </a:xfrm>
+      </p:grpSpPr>
+      <p:sp>
+        <p:nvSpPr>
+          <p:cNvPr id="10" name="Rectangle 9">
+            <a:extLst>
+              <a:ext uri="{FF2B5EF4-FFF2-40B4-BE49-F238E27FC236}">
+                <a16:creationId xmlns:a16="http://schemas.microsoft.com/office/drawing/2014/main" id="{823AC064-BC96-4F32-8AE1-B2FD38754823}"/>
+              </a:ext>
+              <a:ext uri="{C183D7F6-B498-43B3-948B-1728B52AA6E4}">
+                <adec:decorative xmlns:adec="http://schemas.microsoft.com/office/drawing/2017/decorative" val="1"/>
+              </a:ext>
+            </a:extLst>
+          </p:cNvPr>
+          <p:cNvSpPr>
+            <a:spLocks noGrp="1" noRot="1" noChangeAspect="1" noMove="1" noResize="1" noEditPoints="1" noAdjustHandles="1" noChangeArrowheads="1" noChangeShapeType="1" noTextEdit="1"/>
+          </p:cNvSpPr>
+          <p:nvPr>
+            <p:extLst>
+              <p:ext uri="{386F3935-93C4-4BCD-93E2-E3B085C9AB24}">
+                <p16:designElem xmlns:p16="http://schemas.microsoft.com/office/powerpoint/2015/main" val="1"/>
+              </p:ext>
+            </p:extLst>
+          </p:nvPr>
+        </p:nvSpPr>
+        <p:spPr bwMode="ltGray">
+          <a:xfrm>
+            <a:off x="378068" y="343486"/>
+            <a:ext cx="11438793" cy="1844256"/>
+          </a:xfrm>
+          <a:prstGeom prst="rect">
+            <a:avLst/>
+          </a:prstGeom>
+          <a:solidFill>
+            <a:srgbClr val="404040"/>
+          </a:solidFill>
+          <a:ln w="127000" cap="sq" cmpd="thinThick">
+            <a:solidFill>
+              <a:srgbClr val="404040"/>
+            </a:solidFill>
+          </a:ln>
+        </p:spPr>
+        <p:style>
+          <a:lnRef idx="2">
+            <a:schemeClr val="accent1">
+              <a:shade val="50000"/>
+            </a:schemeClr>
+          </a:lnRef>
+          <a:fillRef idx="1">
+            <a:schemeClr val="accent1"/>
+          </a:fillRef>
+          <a:effectRef idx="0">
+            <a:schemeClr val="accent1"/>
+          </a:effectRef>
+          <a:fontRef idx="minor">
+            <a:schemeClr val="lt1"/>
+          </a:fontRef>
+        </p:style>
+        <p:txBody>
+          <a:bodyPr rtlCol="0" anchor="ctr"/>
+          <a:lstStyle/>
+          <a:p>
+            <a:pPr marL="0" marR="0" lvl="0" indent="0" algn="ctr" defTabSz="914400" rtl="0" eaLnBrk="1" fontAlgn="auto" latinLnBrk="0" hangingPunct="1">
+              <a:lnSpc>
+                <a:spcPct val="100000"/>
+              </a:lnSpc>
+              <a:spcBef>
+                <a:spcPts val="0"/>
+              </a:spcBef>
+              <a:spcAft>
+                <a:spcPts val="0"/>
+              </a:spcAft>
+              <a:buClrTx/>
+              <a:buSzTx/>
+              <a:buFontTx/>
+              <a:buNone/>
+              <a:tabLst/>
+              <a:defRPr/>
+            </a:pPr>
+            <a:endParaRPr kumimoji="0" lang="en-US" sz="1800" b="0" i="0" u="none" strike="noStrike" kern="1200" cap="none" spc="0" normalizeH="0" baseline="0" noProof="0">
+              <a:ln>
+                <a:noFill/>
+              </a:ln>
+              <a:solidFill>
+                <a:prstClr val="white"/>
+              </a:solidFill>
+              <a:effectLst/>
+              <a:uLnTx/>
+              <a:uFillTx/>
+              <a:latin typeface="Calibri" panose="020F0502020204030204"/>
+              <a:ea typeface="+mn-ea"/>
+              <a:cs typeface="+mn-cs"/>
+            </a:endParaRPr>
+          </a:p>
+        </p:txBody>
+      </p:sp>
+      <p:sp>
+        <p:nvSpPr>
+          <p:cNvPr id="2" name="Titel 1">
+            <a:extLst>
+              <a:ext uri="{FF2B5EF4-FFF2-40B4-BE49-F238E27FC236}">
+                <a16:creationId xmlns:a16="http://schemas.microsoft.com/office/drawing/2014/main" id="{8B091153-A6EC-4181-8FEF-0EBC2035DE73}"/>
+              </a:ext>
+            </a:extLst>
+          </p:cNvPr>
+          <p:cNvSpPr>
+            <a:spLocks noGrp="1"/>
+          </p:cNvSpPr>
+          <p:nvPr>
+            <p:ph type="title"/>
+          </p:nvPr>
+        </p:nvSpPr>
+        <p:spPr>
+          <a:xfrm>
+            <a:off x="526073" y="466578"/>
+            <a:ext cx="11139854" cy="930447"/>
+          </a:xfrm>
+        </p:spPr>
+        <p:txBody>
+          <a:bodyPr vert="horz" lIns="91440" tIns="45720" rIns="91440" bIns="45720" rtlCol="0" anchor="b">
+            <a:normAutofit/>
+          </a:bodyPr>
+          <a:lstStyle/>
+          <a:p>
+            <a:pPr algn="ctr"/>
+            <a:r>
+              <a:rPr lang="en-US" sz="5400" kern="1200">
+                <a:solidFill>
+                  <a:srgbClr val="FFFFFF"/>
+                </a:solidFill>
+                <a:latin typeface="+mj-lt"/>
+                <a:ea typeface="+mj-ea"/>
+                <a:cs typeface="+mj-cs"/>
+              </a:rPr>
+              <a:t>Fragen?</a:t>
+            </a:r>
+          </a:p>
+        </p:txBody>
+      </p:sp>
+      <p:sp>
+        <p:nvSpPr>
+          <p:cNvPr id="3" name="Inhaltsplatzhalter 2">
+            <a:extLst>
+              <a:ext uri="{FF2B5EF4-FFF2-40B4-BE49-F238E27FC236}">
+                <a16:creationId xmlns:a16="http://schemas.microsoft.com/office/drawing/2014/main" id="{0EC1D7BD-9C2B-4612-942D-FBC9EA4A05A9}"/>
+              </a:ext>
+            </a:extLst>
+          </p:cNvPr>
+          <p:cNvSpPr>
+            <a:spLocks noGrp="1"/>
+          </p:cNvSpPr>
+          <p:nvPr>
+            <p:ph idx="1"/>
+          </p:nvPr>
+        </p:nvSpPr>
+        <p:spPr>
+          <a:xfrm>
+            <a:off x="1524000" y="1525638"/>
+            <a:ext cx="9144000" cy="420001"/>
+          </a:xfrm>
+        </p:spPr>
+        <p:txBody>
+          <a:bodyPr vert="horz" lIns="91440" tIns="45720" rIns="91440" bIns="45720" rtlCol="0">
+            <a:normAutofit/>
+          </a:bodyPr>
+          <a:lstStyle/>
+          <a:p>
+            <a:pPr marL="0" indent="0" algn="ctr">
+              <a:buNone/>
+            </a:pPr>
+            <a:r>
+              <a:rPr lang="en-US" sz="2000" kern="1200" dirty="0" err="1">
+                <a:solidFill>
+                  <a:srgbClr val="E7E6E6"/>
+                </a:solidFill>
+                <a:latin typeface="+mn-lt"/>
+                <a:ea typeface="+mn-ea"/>
+                <a:cs typeface="+mn-cs"/>
+              </a:rPr>
+              <a:t>Vielen</a:t>
+            </a:r>
+            <a:r>
+              <a:rPr lang="en-US" sz="2000" kern="1200" dirty="0">
+                <a:solidFill>
+                  <a:srgbClr val="E7E6E6"/>
+                </a:solidFill>
+                <a:latin typeface="+mn-lt"/>
+                <a:ea typeface="+mn-ea"/>
+                <a:cs typeface="+mn-cs"/>
+              </a:rPr>
+              <a:t> Dank </a:t>
+            </a:r>
+            <a:r>
+              <a:rPr lang="en-US" sz="2000" kern="1200" dirty="0" err="1">
+                <a:solidFill>
+                  <a:srgbClr val="E7E6E6"/>
+                </a:solidFill>
+                <a:latin typeface="+mn-lt"/>
+                <a:ea typeface="+mn-ea"/>
+                <a:cs typeface="+mn-cs"/>
+              </a:rPr>
+              <a:t>für</a:t>
+            </a:r>
+            <a:r>
+              <a:rPr lang="en-US" sz="2000" kern="1200" dirty="0">
+                <a:solidFill>
+                  <a:srgbClr val="E7E6E6"/>
+                </a:solidFill>
+                <a:latin typeface="+mn-lt"/>
+                <a:ea typeface="+mn-ea"/>
+                <a:cs typeface="+mn-cs"/>
+              </a:rPr>
+              <a:t> </a:t>
+            </a:r>
+            <a:r>
+              <a:rPr lang="en-US" sz="2000" kern="1200" dirty="0" err="1">
+                <a:solidFill>
+                  <a:srgbClr val="E7E6E6"/>
+                </a:solidFill>
+                <a:latin typeface="+mn-lt"/>
+                <a:ea typeface="+mn-ea"/>
+                <a:cs typeface="+mn-cs"/>
+              </a:rPr>
+              <a:t>Eure</a:t>
+            </a:r>
+            <a:r>
+              <a:rPr lang="en-US" sz="2000" kern="1200" dirty="0">
+                <a:solidFill>
+                  <a:srgbClr val="E7E6E6"/>
+                </a:solidFill>
+                <a:latin typeface="+mn-lt"/>
+                <a:ea typeface="+mn-ea"/>
+                <a:cs typeface="+mn-cs"/>
+              </a:rPr>
+              <a:t> </a:t>
+            </a:r>
+            <a:r>
+              <a:rPr lang="en-US" sz="2000" kern="1200" dirty="0" err="1">
+                <a:solidFill>
+                  <a:srgbClr val="E7E6E6"/>
+                </a:solidFill>
+                <a:latin typeface="+mn-lt"/>
+                <a:ea typeface="+mn-ea"/>
+                <a:cs typeface="+mn-cs"/>
+              </a:rPr>
+              <a:t>Aufmerksamkeit</a:t>
+            </a:r>
+            <a:r>
+              <a:rPr lang="en-US" sz="2000" kern="1200" dirty="0">
+                <a:solidFill>
+                  <a:srgbClr val="E7E6E6"/>
+                </a:solidFill>
+                <a:latin typeface="+mn-lt"/>
+                <a:ea typeface="+mn-ea"/>
+                <a:cs typeface="+mn-cs"/>
+              </a:rPr>
+              <a:t>!</a:t>
+            </a:r>
+          </a:p>
+        </p:txBody>
+      </p:sp>
+      <p:cxnSp>
+        <p:nvCxnSpPr>
+          <p:cNvPr id="12" name="Straight Connector 11">
+            <a:extLst>
+              <a:ext uri="{FF2B5EF4-FFF2-40B4-BE49-F238E27FC236}">
+                <a16:creationId xmlns:a16="http://schemas.microsoft.com/office/drawing/2014/main" id="{7E7C77BC-7138-40B1-A15B-20F57A494629}"/>
+              </a:ext>
+              <a:ext uri="{C183D7F6-B498-43B3-948B-1728B52AA6E4}">
+                <adec:decorative xmlns:adec="http://schemas.microsoft.com/office/drawing/2017/decorative" val="1"/>
+              </a:ext>
+            </a:extLst>
+          </p:cNvPr>
+          <p:cNvCxnSpPr>
+            <a:cxnSpLocks noGrp="1" noRot="1" noChangeAspect="1" noMove="1" noResize="1" noEditPoints="1" noAdjustHandles="1" noChangeArrowheads="1" noChangeShapeType="1"/>
+          </p:cNvCxnSpPr>
+          <p:nvPr>
+            <p:extLst>
+              <p:ext uri="{386F3935-93C4-4BCD-93E2-E3B085C9AB24}">
+                <p16:designElem xmlns:p16="http://schemas.microsoft.com/office/powerpoint/2015/main" val="1"/>
+              </p:ext>
+            </p:extLst>
+          </p:nvPr>
+        </p:nvCxnSpPr>
+        <p:spPr>
+          <a:xfrm>
+            <a:off x="2209800" y="1448631"/>
+            <a:ext cx="7772400" cy="0"/>
+          </a:xfrm>
+          <a:prstGeom prst="line">
+            <a:avLst/>
+          </a:prstGeom>
+          <a:ln w="22225">
+            <a:solidFill>
+              <a:srgbClr val="D9D9D9"/>
+            </a:solidFill>
+          </a:ln>
+        </p:spPr>
+        <p:style>
+          <a:lnRef idx="1">
+            <a:schemeClr val="accent1"/>
+          </a:lnRef>
+          <a:fillRef idx="0">
+            <a:schemeClr val="accent1"/>
+          </a:fillRef>
+          <a:effectRef idx="0">
+            <a:schemeClr val="accent1"/>
+          </a:effectRef>
+          <a:fontRef idx="minor">
+            <a:schemeClr val="tx1"/>
+          </a:fontRef>
+        </p:style>
+      </p:cxnSp>
+      <p:pic>
+        <p:nvPicPr>
+          <p:cNvPr id="7" name="Graphic 6">
+            <a:extLst>
+              <a:ext uri="{FF2B5EF4-FFF2-40B4-BE49-F238E27FC236}">
+                <a16:creationId xmlns:a16="http://schemas.microsoft.com/office/drawing/2014/main" id="{62CE27A7-0387-444E-82AD-9992707B5343}"/>
+              </a:ext>
+            </a:extLst>
+          </p:cNvPr>
+          <p:cNvPicPr>
+            <a:picLocks noChangeAspect="1"/>
+          </p:cNvPicPr>
+          <p:nvPr/>
+        </p:nvPicPr>
+        <p:blipFill>
+          <a:blip r:embed="rId2">
+            <a:extLst>
+              <a:ext uri="{28A0092B-C50C-407E-A947-70E740481C1C}">
+                <a14:useLocalDpi xmlns:a14="http://schemas.microsoft.com/office/drawing/2010/main" val="0"/>
+              </a:ext>
+              <a:ext uri="{96DAC541-7B7A-43D3-8B79-37D633B846F1}">
+                <asvg:svgBlip xmlns:asvg="http://schemas.microsoft.com/office/drawing/2016/SVG/main" r:embed="rId3"/>
+              </a:ext>
+            </a:extLst>
+          </a:blip>
+          <a:stretch>
+            <a:fillRect/>
+          </a:stretch>
+        </p:blipFill>
+        <p:spPr>
+          <a:xfrm>
+            <a:off x="4069632" y="2509911"/>
+            <a:ext cx="3997637" cy="3997637"/>
+          </a:xfrm>
+          <a:prstGeom prst="rect">
+            <a:avLst/>
+          </a:prstGeom>
+        </p:spPr>
+      </p:pic>
+    </p:spTree>
+    <p:extLst>
+      <p:ext uri="{BB962C8B-B14F-4D97-AF65-F5344CB8AC3E}">
+        <p14:creationId xmlns:p14="http://schemas.microsoft.com/office/powerpoint/2010/main" val="3850624701"/>
+      </p:ext>
+    </p:extLst>
+  </p:cSld>
+  <p:clrMapOvr>
+    <a:masterClrMapping/>
+  </p:clrMapOvr>
+</p:sld>
+</file>
+
 <file path=ppt/slides/slide2.xml><?xml version="1.0" encoding="utf-8"?>
 <p:sld xmlns:a="http://schemas.openxmlformats.org/drawingml/2006/main" xmlns:r="http://schemas.openxmlformats.org/officeDocument/2006/relationships" xmlns:p="http://schemas.openxmlformats.org/presentationml/2006/main">
   <p:cSld>
@@ -16525,6 +17505,246 @@
           <a:p>
             <a:pPr algn="ctr"/>
             <a:r>
+              <a:rPr lang="en-US" sz="4800" dirty="0">
+                <a:solidFill>
+                  <a:srgbClr val="FFFFFF"/>
+                </a:solidFill>
+              </a:rPr>
+              <a:t>Frontend</a:t>
+            </a:r>
+            <a:r>
+              <a:rPr lang="en-US" sz="4800" kern="1200" dirty="0">
+                <a:solidFill>
+                  <a:srgbClr val="FFFFFF"/>
+                </a:solidFill>
+                <a:latin typeface="+mj-lt"/>
+                <a:ea typeface="+mj-ea"/>
+                <a:cs typeface="+mj-cs"/>
+              </a:rPr>
+              <a:t>-Mock</a:t>
+            </a:r>
+          </a:p>
+        </p:txBody>
+      </p:sp>
+      <p:cxnSp>
+        <p:nvCxnSpPr>
+          <p:cNvPr id="12" name="Straight Connector 11">
+            <a:extLst>
+              <a:ext uri="{FF2B5EF4-FFF2-40B4-BE49-F238E27FC236}">
+                <a16:creationId xmlns:a16="http://schemas.microsoft.com/office/drawing/2014/main" id="{38FB9660-F42F-4313-BBC4-47C007FE484C}"/>
+              </a:ext>
+              <a:ext uri="{C183D7F6-B498-43B3-948B-1728B52AA6E4}">
+                <adec:decorative xmlns:adec="http://schemas.microsoft.com/office/drawing/2017/decorative" val="1"/>
+              </a:ext>
+            </a:extLst>
+          </p:cNvPr>
+          <p:cNvCxnSpPr>
+            <a:cxnSpLocks noGrp="1" noRot="1" noChangeAspect="1" noMove="1" noResize="1" noEditPoints="1" noAdjustHandles="1" noChangeArrowheads="1" noChangeShapeType="1"/>
+          </p:cNvCxnSpPr>
+          <p:nvPr>
+            <p:extLst>
+              <p:ext uri="{386F3935-93C4-4BCD-93E2-E3B085C9AB24}">
+                <p16:designElem xmlns:p16="http://schemas.microsoft.com/office/powerpoint/2015/main" val="1"/>
+              </p:ext>
+            </p:extLst>
+          </p:nvPr>
+        </p:nvCxnSpPr>
+        <p:spPr>
+          <a:xfrm>
+            <a:off x="1191126" y="3910267"/>
+            <a:ext cx="2586790" cy="0"/>
+          </a:xfrm>
+          <a:prstGeom prst="line">
+            <a:avLst/>
+          </a:prstGeom>
+          <a:ln w="22225">
+            <a:solidFill>
+              <a:srgbClr val="D9D9D9"/>
+            </a:solidFill>
+          </a:ln>
+        </p:spPr>
+        <p:style>
+          <a:lnRef idx="1">
+            <a:schemeClr val="accent1"/>
+          </a:lnRef>
+          <a:fillRef idx="0">
+            <a:schemeClr val="accent1"/>
+          </a:fillRef>
+          <a:effectRef idx="0">
+            <a:schemeClr val="accent1"/>
+          </a:effectRef>
+          <a:fontRef idx="minor">
+            <a:schemeClr val="tx1"/>
+          </a:fontRef>
+        </p:style>
+      </p:cxnSp>
+      <p:pic>
+        <p:nvPicPr>
+          <p:cNvPr id="6" name="Grafik 5"/>
+          <p:cNvPicPr>
+            <a:picLocks noChangeAspect="1"/>
+          </p:cNvPicPr>
+          <p:nvPr/>
+        </p:nvPicPr>
+        <p:blipFill>
+          <a:blip r:embed="rId2">
+            <a:extLst>
+              <a:ext uri="{28A0092B-C50C-407E-A947-70E740481C1C}">
+                <a14:useLocalDpi xmlns:a14="http://schemas.microsoft.com/office/drawing/2010/main" val="0"/>
+              </a:ext>
+            </a:extLst>
+          </a:blip>
+          <a:stretch>
+            <a:fillRect/>
+          </a:stretch>
+        </p:blipFill>
+        <p:spPr>
+          <a:xfrm>
+            <a:off x="5523433" y="505828"/>
+            <a:ext cx="5943600" cy="5810250"/>
+          </a:xfrm>
+          <a:prstGeom prst="rect">
+            <a:avLst/>
+          </a:prstGeom>
+        </p:spPr>
+      </p:pic>
+    </p:spTree>
+    <p:extLst>
+      <p:ext uri="{BB962C8B-B14F-4D97-AF65-F5344CB8AC3E}">
+        <p14:creationId xmlns:p14="http://schemas.microsoft.com/office/powerpoint/2010/main" val="2570257630"/>
+      </p:ext>
+    </p:extLst>
+  </p:cSld>
+  <p:clrMapOvr>
+    <a:masterClrMapping/>
+  </p:clrMapOvr>
+</p:sld>
+</file>
+
+<file path=ppt/slides/slide5.xml><?xml version="1.0" encoding="utf-8"?>
+<p:sld xmlns:a="http://schemas.openxmlformats.org/drawingml/2006/main" xmlns:r="http://schemas.openxmlformats.org/officeDocument/2006/relationships" xmlns:p="http://schemas.openxmlformats.org/presentationml/2006/main">
+  <p:cSld>
+    <p:bg>
+      <p:bgPr>
+        <a:solidFill>
+          <a:schemeClr val="bg1"/>
+        </a:solidFill>
+        <a:effectLst/>
+      </p:bgPr>
+    </p:bg>
+    <p:spTree>
+      <p:nvGrpSpPr>
+        <p:cNvPr id="1" name=""/>
+        <p:cNvGrpSpPr/>
+        <p:nvPr/>
+      </p:nvGrpSpPr>
+      <p:grpSpPr>
+        <a:xfrm>
+          <a:off x="0" y="0"/>
+          <a:ext cx="0" cy="0"/>
+          <a:chOff x="0" y="0"/>
+          <a:chExt cx="0" cy="0"/>
+        </a:xfrm>
+      </p:grpSpPr>
+      <p:sp>
+        <p:nvSpPr>
+          <p:cNvPr id="10" name="Rectangle 9">
+            <a:extLst>
+              <a:ext uri="{FF2B5EF4-FFF2-40B4-BE49-F238E27FC236}">
+                <a16:creationId xmlns:a16="http://schemas.microsoft.com/office/drawing/2014/main" id="{AB45A142-4255-493C-8284-5D566C121B10}"/>
+              </a:ext>
+              <a:ext uri="{C183D7F6-B498-43B3-948B-1728B52AA6E4}">
+                <adec:decorative xmlns:adec="http://schemas.microsoft.com/office/drawing/2017/decorative" val="1"/>
+              </a:ext>
+            </a:extLst>
+          </p:cNvPr>
+          <p:cNvSpPr>
+            <a:spLocks noGrp="1" noRot="1" noChangeAspect="1" noMove="1" noResize="1" noEditPoints="1" noAdjustHandles="1" noChangeArrowheads="1" noChangeShapeType="1" noTextEdit="1"/>
+          </p:cNvSpPr>
+          <p:nvPr>
+            <p:extLst>
+              <p:ext uri="{386F3935-93C4-4BCD-93E2-E3B085C9AB24}">
+                <p16:designElem xmlns:p16="http://schemas.microsoft.com/office/powerpoint/2015/main" val="1"/>
+              </p:ext>
+            </p:extLst>
+          </p:nvPr>
+        </p:nvSpPr>
+        <p:spPr bwMode="ltGray">
+          <a:xfrm>
+            <a:off x="336884" y="321177"/>
+            <a:ext cx="4332307" cy="6179552"/>
+          </a:xfrm>
+          <a:prstGeom prst="rect">
+            <a:avLst/>
+          </a:prstGeom>
+          <a:solidFill>
+            <a:srgbClr val="404040">
+              <a:alpha val="89804"/>
+            </a:srgbClr>
+          </a:solidFill>
+          <a:ln w="127000" cap="sq" cmpd="thinThick">
+            <a:solidFill>
+              <a:srgbClr val="595959">
+                <a:alpha val="80000"/>
+              </a:srgbClr>
+            </a:solidFill>
+          </a:ln>
+        </p:spPr>
+        <p:style>
+          <a:lnRef idx="2">
+            <a:schemeClr val="accent1">
+              <a:shade val="50000"/>
+            </a:schemeClr>
+          </a:lnRef>
+          <a:fillRef idx="1">
+            <a:schemeClr val="accent1"/>
+          </a:fillRef>
+          <a:effectRef idx="0">
+            <a:schemeClr val="accent1"/>
+          </a:effectRef>
+          <a:fontRef idx="minor">
+            <a:schemeClr val="lt1"/>
+          </a:fontRef>
+        </p:style>
+        <p:txBody>
+          <a:bodyPr rtlCol="0" anchor="ctr"/>
+          <a:lstStyle/>
+          <a:p>
+            <a:pPr algn="ctr"/>
+            <a:endParaRPr lang="en-US"/>
+          </a:p>
+        </p:txBody>
+      </p:sp>
+      <p:sp>
+        <p:nvSpPr>
+          <p:cNvPr id="2" name="Titel 1">
+            <a:extLst>
+              <a:ext uri="{FF2B5EF4-FFF2-40B4-BE49-F238E27FC236}">
+                <a16:creationId xmlns:a16="http://schemas.microsoft.com/office/drawing/2014/main" id="{C404AC6D-2C82-4BA8-B681-778ECB7633DC}"/>
+              </a:ext>
+            </a:extLst>
+          </p:cNvPr>
+          <p:cNvSpPr>
+            <a:spLocks noGrp="1"/>
+          </p:cNvSpPr>
+          <p:nvPr>
+            <p:ph type="title"/>
+          </p:nvPr>
+        </p:nvSpPr>
+        <p:spPr>
+          <a:xfrm>
+            <a:off x="674237" y="914400"/>
+            <a:ext cx="3657600" cy="2887579"/>
+          </a:xfrm>
+        </p:spPr>
+        <p:txBody>
+          <a:bodyPr vert="horz" lIns="91440" tIns="45720" rIns="91440" bIns="45720" rtlCol="0" anchor="b">
+            <a:normAutofit/>
+          </a:bodyPr>
+          <a:lstStyle/>
+          <a:p>
+            <a:pPr algn="ctr"/>
+            <a:r>
               <a:rPr lang="en-US" sz="4800" kern="1200">
                 <a:solidFill>
                   <a:srgbClr val="FFFFFF"/>
@@ -16641,7 +17861,561 @@
 </p:sld>
 </file>
 
-<file path=ppt/slides/slide5.xml><?xml version="1.0" encoding="utf-8"?>
+<file path=ppt/slides/slide6.xml><?xml version="1.0" encoding="utf-8"?>
+<p:sld xmlns:a="http://schemas.openxmlformats.org/drawingml/2006/main" xmlns:r="http://schemas.openxmlformats.org/officeDocument/2006/relationships" xmlns:p="http://schemas.openxmlformats.org/presentationml/2006/main">
+  <p:cSld>
+    <p:bg>
+      <p:bgPr>
+        <a:solidFill>
+          <a:schemeClr val="bg1"/>
+        </a:solidFill>
+        <a:effectLst/>
+      </p:bgPr>
+    </p:bg>
+    <p:spTree>
+      <p:nvGrpSpPr>
+        <p:cNvPr id="1" name=""/>
+        <p:cNvGrpSpPr/>
+        <p:nvPr/>
+      </p:nvGrpSpPr>
+      <p:grpSpPr>
+        <a:xfrm>
+          <a:off x="0" y="0"/>
+          <a:ext cx="0" cy="0"/>
+          <a:chOff x="0" y="0"/>
+          <a:chExt cx="0" cy="0"/>
+        </a:xfrm>
+      </p:grpSpPr>
+      <p:sp>
+        <p:nvSpPr>
+          <p:cNvPr id="10" name="Rectangle 9">
+            <a:extLst>
+              <a:ext uri="{FF2B5EF4-FFF2-40B4-BE49-F238E27FC236}">
+                <a16:creationId xmlns:a16="http://schemas.microsoft.com/office/drawing/2014/main" id="{AB45A142-4255-493C-8284-5D566C121B10}"/>
+              </a:ext>
+              <a:ext uri="{C183D7F6-B498-43B3-948B-1728B52AA6E4}">
+                <adec:decorative xmlns:adec="http://schemas.microsoft.com/office/drawing/2017/decorative" val="1"/>
+              </a:ext>
+            </a:extLst>
+          </p:cNvPr>
+          <p:cNvSpPr>
+            <a:spLocks noGrp="1" noRot="1" noChangeAspect="1" noMove="1" noResize="1" noEditPoints="1" noAdjustHandles="1" noChangeArrowheads="1" noChangeShapeType="1" noTextEdit="1"/>
+          </p:cNvSpPr>
+          <p:nvPr>
+            <p:extLst>
+              <p:ext uri="{386F3935-93C4-4BCD-93E2-E3B085C9AB24}">
+                <p16:designElem xmlns:p16="http://schemas.microsoft.com/office/powerpoint/2015/main" val="1"/>
+              </p:ext>
+            </p:extLst>
+          </p:nvPr>
+        </p:nvSpPr>
+        <p:spPr bwMode="ltGray">
+          <a:xfrm>
+            <a:off x="336884" y="321177"/>
+            <a:ext cx="4332307" cy="6179552"/>
+          </a:xfrm>
+          <a:prstGeom prst="rect">
+            <a:avLst/>
+          </a:prstGeom>
+          <a:solidFill>
+            <a:srgbClr val="404040">
+              <a:alpha val="89804"/>
+            </a:srgbClr>
+          </a:solidFill>
+          <a:ln w="127000" cap="sq" cmpd="thinThick">
+            <a:solidFill>
+              <a:srgbClr val="595959">
+                <a:alpha val="80000"/>
+              </a:srgbClr>
+            </a:solidFill>
+          </a:ln>
+        </p:spPr>
+        <p:style>
+          <a:lnRef idx="2">
+            <a:schemeClr val="accent1">
+              <a:shade val="50000"/>
+            </a:schemeClr>
+          </a:lnRef>
+          <a:fillRef idx="1">
+            <a:schemeClr val="accent1"/>
+          </a:fillRef>
+          <a:effectRef idx="0">
+            <a:schemeClr val="accent1"/>
+          </a:effectRef>
+          <a:fontRef idx="minor">
+            <a:schemeClr val="lt1"/>
+          </a:fontRef>
+        </p:style>
+        <p:txBody>
+          <a:bodyPr rtlCol="0" anchor="ctr"/>
+          <a:lstStyle/>
+          <a:p>
+            <a:pPr algn="ctr"/>
+            <a:endParaRPr lang="en-US"/>
+          </a:p>
+        </p:txBody>
+      </p:sp>
+      <p:sp>
+        <p:nvSpPr>
+          <p:cNvPr id="2" name="Titel 1">
+            <a:extLst>
+              <a:ext uri="{FF2B5EF4-FFF2-40B4-BE49-F238E27FC236}">
+                <a16:creationId xmlns:a16="http://schemas.microsoft.com/office/drawing/2014/main" id="{C404AC6D-2C82-4BA8-B681-778ECB7633DC}"/>
+              </a:ext>
+            </a:extLst>
+          </p:cNvPr>
+          <p:cNvSpPr>
+            <a:spLocks noGrp="1"/>
+          </p:cNvSpPr>
+          <p:nvPr>
+            <p:ph type="title"/>
+          </p:nvPr>
+        </p:nvSpPr>
+        <p:spPr>
+          <a:xfrm>
+            <a:off x="674237" y="914400"/>
+            <a:ext cx="3657600" cy="2887579"/>
+          </a:xfrm>
+        </p:spPr>
+        <p:txBody>
+          <a:bodyPr vert="horz" lIns="91440" tIns="45720" rIns="91440" bIns="45720" rtlCol="0" anchor="b">
+            <a:normAutofit/>
+          </a:bodyPr>
+          <a:lstStyle/>
+          <a:p>
+            <a:pPr algn="ctr"/>
+            <a:r>
+              <a:rPr lang="en-US" sz="4800" kern="1200" dirty="0">
+                <a:solidFill>
+                  <a:srgbClr val="FFFFFF"/>
+                </a:solidFill>
+                <a:latin typeface="+mj-lt"/>
+                <a:ea typeface="+mj-ea"/>
+                <a:cs typeface="+mj-cs"/>
+              </a:rPr>
+              <a:t>Backend-</a:t>
+            </a:r>
+            <a:r>
+              <a:rPr lang="en-US" sz="4800" kern="1200" dirty="0" err="1">
+                <a:solidFill>
+                  <a:srgbClr val="FFFFFF"/>
+                </a:solidFill>
+                <a:latin typeface="+mj-lt"/>
+                <a:ea typeface="+mj-ea"/>
+                <a:cs typeface="+mj-cs"/>
+              </a:rPr>
+              <a:t>Ablauf</a:t>
+            </a:r>
+            <a:endParaRPr lang="en-US" sz="4800" kern="1200" dirty="0">
+              <a:solidFill>
+                <a:srgbClr val="FFFFFF"/>
+              </a:solidFill>
+              <a:latin typeface="+mj-lt"/>
+              <a:ea typeface="+mj-ea"/>
+              <a:cs typeface="+mj-cs"/>
+            </a:endParaRPr>
+          </a:p>
+        </p:txBody>
+      </p:sp>
+      <p:cxnSp>
+        <p:nvCxnSpPr>
+          <p:cNvPr id="12" name="Straight Connector 11">
+            <a:extLst>
+              <a:ext uri="{FF2B5EF4-FFF2-40B4-BE49-F238E27FC236}">
+                <a16:creationId xmlns:a16="http://schemas.microsoft.com/office/drawing/2014/main" id="{38FB9660-F42F-4313-BBC4-47C007FE484C}"/>
+              </a:ext>
+              <a:ext uri="{C183D7F6-B498-43B3-948B-1728B52AA6E4}">
+                <adec:decorative xmlns:adec="http://schemas.microsoft.com/office/drawing/2017/decorative" val="1"/>
+              </a:ext>
+            </a:extLst>
+          </p:cNvPr>
+          <p:cNvCxnSpPr>
+            <a:cxnSpLocks noGrp="1" noRot="1" noChangeAspect="1" noMove="1" noResize="1" noEditPoints="1" noAdjustHandles="1" noChangeArrowheads="1" noChangeShapeType="1"/>
+          </p:cNvCxnSpPr>
+          <p:nvPr>
+            <p:extLst>
+              <p:ext uri="{386F3935-93C4-4BCD-93E2-E3B085C9AB24}">
+                <p16:designElem xmlns:p16="http://schemas.microsoft.com/office/powerpoint/2015/main" val="1"/>
+              </p:ext>
+            </p:extLst>
+          </p:nvPr>
+        </p:nvCxnSpPr>
+        <p:spPr>
+          <a:xfrm>
+            <a:off x="1191126" y="3910267"/>
+            <a:ext cx="2586790" cy="0"/>
+          </a:xfrm>
+          <a:prstGeom prst="line">
+            <a:avLst/>
+          </a:prstGeom>
+          <a:ln w="22225">
+            <a:solidFill>
+              <a:srgbClr val="D9D9D9"/>
+            </a:solidFill>
+          </a:ln>
+        </p:spPr>
+        <p:style>
+          <a:lnRef idx="1">
+            <a:schemeClr val="accent1"/>
+          </a:lnRef>
+          <a:fillRef idx="0">
+            <a:schemeClr val="accent1"/>
+          </a:fillRef>
+          <a:effectRef idx="0">
+            <a:schemeClr val="accent1"/>
+          </a:effectRef>
+          <a:fontRef idx="minor">
+            <a:schemeClr val="tx1"/>
+          </a:fontRef>
+        </p:style>
+      </p:cxnSp>
+      <p:pic>
+        <p:nvPicPr>
+          <p:cNvPr id="4" name="Grafik 3">
+            <a:extLst>
+              <a:ext uri="{FF2B5EF4-FFF2-40B4-BE49-F238E27FC236}">
+                <a16:creationId xmlns:a16="http://schemas.microsoft.com/office/drawing/2014/main" id="{F830E2FC-8027-4357-B104-D6B8C0255A58}"/>
+              </a:ext>
+            </a:extLst>
+          </p:cNvPr>
+          <p:cNvPicPr>
+            <a:picLocks noChangeAspect="1"/>
+          </p:cNvPicPr>
+          <p:nvPr/>
+        </p:nvPicPr>
+        <p:blipFill>
+          <a:blip r:embed="rId2">
+            <a:extLst>
+              <a:ext uri="{28A0092B-C50C-407E-A947-70E740481C1C}">
+                <a14:useLocalDpi xmlns:a14="http://schemas.microsoft.com/office/drawing/2010/main" val="0"/>
+              </a:ext>
+            </a:extLst>
+          </a:blip>
+          <a:stretch>
+            <a:fillRect/>
+          </a:stretch>
+        </p:blipFill>
+        <p:spPr>
+          <a:xfrm>
+            <a:off x="4820319" y="1334887"/>
+            <a:ext cx="7268927" cy="4188226"/>
+          </a:xfrm>
+          <a:prstGeom prst="rect">
+            <a:avLst/>
+          </a:prstGeom>
+        </p:spPr>
+      </p:pic>
+    </p:spTree>
+    <p:extLst>
+      <p:ext uri="{BB962C8B-B14F-4D97-AF65-F5344CB8AC3E}">
+        <p14:creationId xmlns:p14="http://schemas.microsoft.com/office/powerpoint/2010/main" val="4039199801"/>
+      </p:ext>
+    </p:extLst>
+  </p:cSld>
+  <p:clrMapOvr>
+    <a:masterClrMapping/>
+  </p:clrMapOvr>
+</p:sld>
+</file>
+
+<file path=ppt/slides/slide7.xml><?xml version="1.0" encoding="utf-8"?>
+<p:sld xmlns:a="http://schemas.openxmlformats.org/drawingml/2006/main" xmlns:r="http://schemas.openxmlformats.org/officeDocument/2006/relationships" xmlns:p="http://schemas.openxmlformats.org/presentationml/2006/main">
+  <p:cSld>
+    <p:bg>
+      <p:bgPr>
+        <a:solidFill>
+          <a:schemeClr val="bg1"/>
+        </a:solidFill>
+        <a:effectLst/>
+      </p:bgPr>
+    </p:bg>
+    <p:spTree>
+      <p:nvGrpSpPr>
+        <p:cNvPr id="1" name=""/>
+        <p:cNvGrpSpPr/>
+        <p:nvPr/>
+      </p:nvGrpSpPr>
+      <p:grpSpPr>
+        <a:xfrm>
+          <a:off x="0" y="0"/>
+          <a:ext cx="0" cy="0"/>
+          <a:chOff x="0" y="0"/>
+          <a:chExt cx="0" cy="0"/>
+        </a:xfrm>
+      </p:grpSpPr>
+      <p:sp>
+        <p:nvSpPr>
+          <p:cNvPr id="10" name="Rectangle 9">
+            <a:extLst>
+              <a:ext uri="{FF2B5EF4-FFF2-40B4-BE49-F238E27FC236}">
+                <a16:creationId xmlns:a16="http://schemas.microsoft.com/office/drawing/2014/main" id="{AB45A142-4255-493C-8284-5D566C121B10}"/>
+              </a:ext>
+              <a:ext uri="{C183D7F6-B498-43B3-948B-1728B52AA6E4}">
+                <adec:decorative xmlns:adec="http://schemas.microsoft.com/office/drawing/2017/decorative" val="1"/>
+              </a:ext>
+            </a:extLst>
+          </p:cNvPr>
+          <p:cNvSpPr>
+            <a:spLocks noGrp="1" noRot="1" noChangeAspect="1" noMove="1" noResize="1" noEditPoints="1" noAdjustHandles="1" noChangeArrowheads="1" noChangeShapeType="1" noTextEdit="1"/>
+          </p:cNvSpPr>
+          <p:nvPr>
+            <p:extLst>
+              <p:ext uri="{386F3935-93C4-4BCD-93E2-E3B085C9AB24}">
+                <p16:designElem xmlns:p16="http://schemas.microsoft.com/office/powerpoint/2015/main" val="1"/>
+              </p:ext>
+            </p:extLst>
+          </p:nvPr>
+        </p:nvSpPr>
+        <p:spPr bwMode="ltGray">
+          <a:xfrm>
+            <a:off x="336884" y="321177"/>
+            <a:ext cx="4332307" cy="6179552"/>
+          </a:xfrm>
+          <a:prstGeom prst="rect">
+            <a:avLst/>
+          </a:prstGeom>
+          <a:solidFill>
+            <a:srgbClr val="404040">
+              <a:alpha val="89804"/>
+            </a:srgbClr>
+          </a:solidFill>
+          <a:ln w="127000" cap="sq" cmpd="thinThick">
+            <a:solidFill>
+              <a:srgbClr val="595959">
+                <a:alpha val="80000"/>
+              </a:srgbClr>
+            </a:solidFill>
+          </a:ln>
+        </p:spPr>
+        <p:style>
+          <a:lnRef idx="2">
+            <a:schemeClr val="accent1">
+              <a:shade val="50000"/>
+            </a:schemeClr>
+          </a:lnRef>
+          <a:fillRef idx="1">
+            <a:schemeClr val="accent1"/>
+          </a:fillRef>
+          <a:effectRef idx="0">
+            <a:schemeClr val="accent1"/>
+          </a:effectRef>
+          <a:fontRef idx="minor">
+            <a:schemeClr val="lt1"/>
+          </a:fontRef>
+        </p:style>
+        <p:txBody>
+          <a:bodyPr rtlCol="0" anchor="ctr"/>
+          <a:lstStyle/>
+          <a:p>
+            <a:pPr algn="ctr"/>
+            <a:endParaRPr lang="en-US"/>
+          </a:p>
+        </p:txBody>
+      </p:sp>
+      <p:sp>
+        <p:nvSpPr>
+          <p:cNvPr id="2" name="Titel 1">
+            <a:extLst>
+              <a:ext uri="{FF2B5EF4-FFF2-40B4-BE49-F238E27FC236}">
+                <a16:creationId xmlns:a16="http://schemas.microsoft.com/office/drawing/2014/main" id="{C404AC6D-2C82-4BA8-B681-778ECB7633DC}"/>
+              </a:ext>
+            </a:extLst>
+          </p:cNvPr>
+          <p:cNvSpPr>
+            <a:spLocks noGrp="1"/>
+          </p:cNvSpPr>
+          <p:nvPr>
+            <p:ph type="title"/>
+          </p:nvPr>
+        </p:nvSpPr>
+        <p:spPr>
+          <a:xfrm>
+            <a:off x="674237" y="914400"/>
+            <a:ext cx="3657600" cy="2887579"/>
+          </a:xfrm>
+        </p:spPr>
+        <p:txBody>
+          <a:bodyPr vert="horz" lIns="91440" tIns="45720" rIns="91440" bIns="45720" rtlCol="0" anchor="b">
+            <a:normAutofit/>
+          </a:bodyPr>
+          <a:lstStyle/>
+          <a:p>
+            <a:pPr algn="ctr"/>
+            <a:r>
+              <a:rPr lang="en-US" sz="4800" kern="1200" dirty="0">
+                <a:solidFill>
+                  <a:srgbClr val="FFFFFF"/>
+                </a:solidFill>
+                <a:latin typeface="+mj-lt"/>
+                <a:ea typeface="+mj-ea"/>
+                <a:cs typeface="+mj-cs"/>
+              </a:rPr>
+              <a:t>Backend-</a:t>
+            </a:r>
+            <a:r>
+              <a:rPr lang="en-US" sz="4800" kern="1200" dirty="0" err="1">
+                <a:solidFill>
+                  <a:srgbClr val="FFFFFF"/>
+                </a:solidFill>
+                <a:latin typeface="+mj-lt"/>
+                <a:ea typeface="+mj-ea"/>
+                <a:cs typeface="+mj-cs"/>
+              </a:rPr>
+              <a:t>Umsetzung</a:t>
+            </a:r>
+            <a:endParaRPr lang="en-US" sz="4800" kern="1200" dirty="0">
+              <a:solidFill>
+                <a:srgbClr val="FFFFFF"/>
+              </a:solidFill>
+              <a:latin typeface="+mj-lt"/>
+              <a:ea typeface="+mj-ea"/>
+              <a:cs typeface="+mj-cs"/>
+            </a:endParaRPr>
+          </a:p>
+        </p:txBody>
+      </p:sp>
+      <p:cxnSp>
+        <p:nvCxnSpPr>
+          <p:cNvPr id="12" name="Straight Connector 11">
+            <a:extLst>
+              <a:ext uri="{FF2B5EF4-FFF2-40B4-BE49-F238E27FC236}">
+                <a16:creationId xmlns:a16="http://schemas.microsoft.com/office/drawing/2014/main" id="{38FB9660-F42F-4313-BBC4-47C007FE484C}"/>
+              </a:ext>
+              <a:ext uri="{C183D7F6-B498-43B3-948B-1728B52AA6E4}">
+                <adec:decorative xmlns:adec="http://schemas.microsoft.com/office/drawing/2017/decorative" val="1"/>
+              </a:ext>
+            </a:extLst>
+          </p:cNvPr>
+          <p:cNvCxnSpPr>
+            <a:cxnSpLocks noGrp="1" noRot="1" noChangeAspect="1" noMove="1" noResize="1" noEditPoints="1" noAdjustHandles="1" noChangeArrowheads="1" noChangeShapeType="1"/>
+          </p:cNvCxnSpPr>
+          <p:nvPr>
+            <p:extLst>
+              <p:ext uri="{386F3935-93C4-4BCD-93E2-E3B085C9AB24}">
+                <p16:designElem xmlns:p16="http://schemas.microsoft.com/office/powerpoint/2015/main" val="1"/>
+              </p:ext>
+            </p:extLst>
+          </p:nvPr>
+        </p:nvCxnSpPr>
+        <p:spPr>
+          <a:xfrm>
+            <a:off x="1191126" y="3910267"/>
+            <a:ext cx="2586790" cy="0"/>
+          </a:xfrm>
+          <a:prstGeom prst="line">
+            <a:avLst/>
+          </a:prstGeom>
+          <a:ln w="22225">
+            <a:solidFill>
+              <a:srgbClr val="D9D9D9"/>
+            </a:solidFill>
+          </a:ln>
+        </p:spPr>
+        <p:style>
+          <a:lnRef idx="1">
+            <a:schemeClr val="accent1"/>
+          </a:lnRef>
+          <a:fillRef idx="0">
+            <a:schemeClr val="accent1"/>
+          </a:fillRef>
+          <a:effectRef idx="0">
+            <a:schemeClr val="accent1"/>
+          </a:effectRef>
+          <a:fontRef idx="minor">
+            <a:schemeClr val="tx1"/>
+          </a:fontRef>
+        </p:style>
+      </p:cxnSp>
+      <p:pic>
+        <p:nvPicPr>
+          <p:cNvPr id="5" name="Grafik 4">
+            <a:extLst>
+              <a:ext uri="{FF2B5EF4-FFF2-40B4-BE49-F238E27FC236}">
+                <a16:creationId xmlns:a16="http://schemas.microsoft.com/office/drawing/2014/main" id="{F3B52AC7-289A-49DA-ABE3-120A4302222B}"/>
+              </a:ext>
+            </a:extLst>
+          </p:cNvPr>
+          <p:cNvPicPr>
+            <a:picLocks noChangeAspect="1"/>
+          </p:cNvPicPr>
+          <p:nvPr/>
+        </p:nvPicPr>
+        <p:blipFill>
+          <a:blip r:embed="rId2">
+            <a:extLst>
+              <a:ext uri="{28A0092B-C50C-407E-A947-70E740481C1C}">
+                <a14:useLocalDpi xmlns:a14="http://schemas.microsoft.com/office/drawing/2010/main" val="0"/>
+              </a:ext>
+            </a:extLst>
+          </a:blip>
+          <a:stretch>
+            <a:fillRect/>
+          </a:stretch>
+        </p:blipFill>
+        <p:spPr>
+          <a:xfrm>
+            <a:off x="6096000" y="2187143"/>
+            <a:ext cx="4666667" cy="2447619"/>
+          </a:xfrm>
+          <a:prstGeom prst="rect">
+            <a:avLst/>
+          </a:prstGeom>
+        </p:spPr>
+      </p:pic>
+      <p:sp>
+        <p:nvSpPr>
+          <p:cNvPr id="6" name="Rechteck 5">
+            <a:extLst>
+              <a:ext uri="{FF2B5EF4-FFF2-40B4-BE49-F238E27FC236}">
+                <a16:creationId xmlns:a16="http://schemas.microsoft.com/office/drawing/2014/main" id="{FD6792BD-C36A-4520-A528-F0296EE9C464}"/>
+              </a:ext>
+            </a:extLst>
+          </p:cNvPr>
+          <p:cNvSpPr/>
+          <p:nvPr/>
+        </p:nvSpPr>
+        <p:spPr>
+          <a:xfrm>
+            <a:off x="8361440" y="6627168"/>
+            <a:ext cx="6096000" cy="230832"/>
+          </a:xfrm>
+          <a:prstGeom prst="rect">
+            <a:avLst/>
+          </a:prstGeom>
+        </p:spPr>
+        <p:txBody>
+          <a:bodyPr>
+            <a:spAutoFit/>
+          </a:bodyPr>
+          <a:lstStyle/>
+          <a:p>
+            <a:r>
+              <a:rPr lang="de-DE" sz="900" dirty="0">
+                <a:hlinkClick r:id="rId3"/>
+              </a:rPr>
+              <a:t>https://sdtimes.com/wp-content/uploads/2018/03/spring-boot-490x257.png</a:t>
+            </a:r>
+            <a:r>
+              <a:rPr lang="de-DE" sz="900" dirty="0"/>
+              <a:t> </a:t>
+            </a:r>
+          </a:p>
+        </p:txBody>
+      </p:sp>
+    </p:spTree>
+    <p:extLst>
+      <p:ext uri="{BB962C8B-B14F-4D97-AF65-F5344CB8AC3E}">
+        <p14:creationId xmlns:p14="http://schemas.microsoft.com/office/powerpoint/2010/main" val="52943835"/>
+      </p:ext>
+    </p:extLst>
+  </p:cSld>
+  <p:clrMapOvr>
+    <a:masterClrMapping/>
+  </p:clrMapOvr>
+</p:sld>
+</file>
+
+<file path=ppt/slides/slide8.xml><?xml version="1.0" encoding="utf-8"?>
 <p:sld xmlns:a="http://schemas.openxmlformats.org/drawingml/2006/main" xmlns:r="http://schemas.openxmlformats.org/officeDocument/2006/relationships" xmlns:p="http://schemas.openxmlformats.org/presentationml/2006/main">
   <p:cSld>
     <p:bg>
@@ -17230,7 +19004,7 @@
 </p:sld>
 </file>
 
-<file path=ppt/slides/slide6.xml><?xml version="1.0" encoding="utf-8"?>
+<file path=ppt/slides/slide9.xml><?xml version="1.0" encoding="utf-8"?>
 <p:sld xmlns:a="http://schemas.openxmlformats.org/drawingml/2006/main" xmlns:r="http://schemas.openxmlformats.org/officeDocument/2006/relationships" xmlns:p="http://schemas.openxmlformats.org/presentationml/2006/main">
   <p:cSld>
     <p:bg>
@@ -17480,983 +19254,6 @@
     <p:extLst>
       <p:ext uri="{BB962C8B-B14F-4D97-AF65-F5344CB8AC3E}">
         <p14:creationId xmlns:p14="http://schemas.microsoft.com/office/powerpoint/2010/main" val="3756606963"/>
-      </p:ext>
-    </p:extLst>
-  </p:cSld>
-  <p:clrMapOvr>
-    <a:masterClrMapping/>
-  </p:clrMapOvr>
-</p:sld>
-</file>
-
-<file path=ppt/slides/slide7.xml><?xml version="1.0" encoding="utf-8"?>
-<p:sld xmlns:a="http://schemas.openxmlformats.org/drawingml/2006/main" xmlns:r="http://schemas.openxmlformats.org/officeDocument/2006/relationships" xmlns:p="http://schemas.openxmlformats.org/presentationml/2006/main">
-  <p:cSld>
-    <p:bg>
-      <p:bgPr>
-        <a:solidFill>
-          <a:schemeClr val="bg1"/>
-        </a:solidFill>
-        <a:effectLst/>
-      </p:bgPr>
-    </p:bg>
-    <p:spTree>
-      <p:nvGrpSpPr>
-        <p:cNvPr id="1" name=""/>
-        <p:cNvGrpSpPr/>
-        <p:nvPr/>
-      </p:nvGrpSpPr>
-      <p:grpSpPr>
-        <a:xfrm>
-          <a:off x="0" y="0"/>
-          <a:ext cx="0" cy="0"/>
-          <a:chOff x="0" y="0"/>
-          <a:chExt cx="0" cy="0"/>
-        </a:xfrm>
-      </p:grpSpPr>
-      <p:sp>
-        <p:nvSpPr>
-          <p:cNvPr id="14" name="Freeform: Shape 9">
-            <a:extLst>
-              <a:ext uri="{FF2B5EF4-FFF2-40B4-BE49-F238E27FC236}">
-                <a16:creationId xmlns:a16="http://schemas.microsoft.com/office/drawing/2014/main" id="{46C2E80F-49A6-4372-B103-219D417A55ED}"/>
-              </a:ext>
-              <a:ext uri="{C183D7F6-B498-43B3-948B-1728B52AA6E4}">
-                <adec:decorative xmlns:adec="http://schemas.microsoft.com/office/drawing/2017/decorative" val="1"/>
-              </a:ext>
-            </a:extLst>
-          </p:cNvPr>
-          <p:cNvSpPr>
-            <a:spLocks noGrp="1" noRot="1" noChangeAspect="1" noMove="1" noResize="1" noEditPoints="1" noAdjustHandles="1" noChangeArrowheads="1" noChangeShapeType="1" noTextEdit="1"/>
-          </p:cNvSpPr>
-          <p:nvPr>
-            <p:extLst>
-              <p:ext uri="{386F3935-93C4-4BCD-93E2-E3B085C9AB24}">
-                <p16:designElem xmlns:p16="http://schemas.microsoft.com/office/powerpoint/2015/main" val="1"/>
-              </p:ext>
-            </p:extLst>
-          </p:nvPr>
-        </p:nvSpPr>
-        <p:spPr>
-          <a:xfrm>
-            <a:off x="484096" y="470925"/>
-            <a:ext cx="4381009" cy="5892104"/>
-          </a:xfrm>
-          <a:custGeom>
-            <a:avLst/>
-            <a:gdLst>
-              <a:gd name="connsiteX0" fmla="*/ 0 w 4381009"/>
-              <a:gd name="connsiteY0" fmla="*/ 0 h 5892104"/>
-              <a:gd name="connsiteX1" fmla="*/ 4157628 w 4381009"/>
-              <a:gd name="connsiteY1" fmla="*/ 0 h 5892104"/>
-              <a:gd name="connsiteX2" fmla="*/ 4169302 w 4381009"/>
-              <a:gd name="connsiteY2" fmla="*/ 68659 h 5892104"/>
-              <a:gd name="connsiteX3" fmla="*/ 4191571 w 4381009"/>
-              <a:gd name="connsiteY3" fmla="*/ 205472 h 5892104"/>
-              <a:gd name="connsiteX4" fmla="*/ 4213368 w 4381009"/>
-              <a:gd name="connsiteY4" fmla="*/ 342890 h 5892104"/>
-              <a:gd name="connsiteX5" fmla="*/ 4232030 w 4381009"/>
-              <a:gd name="connsiteY5" fmla="*/ 480913 h 5892104"/>
-              <a:gd name="connsiteX6" fmla="*/ 4250848 w 4381009"/>
-              <a:gd name="connsiteY6" fmla="*/ 618332 h 5892104"/>
-              <a:gd name="connsiteX7" fmla="*/ 4268412 w 4381009"/>
-              <a:gd name="connsiteY7" fmla="*/ 756355 h 5892104"/>
-              <a:gd name="connsiteX8" fmla="*/ 4283467 w 4381009"/>
-              <a:gd name="connsiteY8" fmla="*/ 892563 h 5892104"/>
-              <a:gd name="connsiteX9" fmla="*/ 4297737 w 4381009"/>
-              <a:gd name="connsiteY9" fmla="*/ 1030587 h 5892104"/>
-              <a:gd name="connsiteX10" fmla="*/ 4310754 w 4381009"/>
-              <a:gd name="connsiteY10" fmla="*/ 1168005 h 5892104"/>
-              <a:gd name="connsiteX11" fmla="*/ 4322045 w 4381009"/>
-              <a:gd name="connsiteY11" fmla="*/ 1303002 h 5892104"/>
-              <a:gd name="connsiteX12" fmla="*/ 4333336 w 4381009"/>
-              <a:gd name="connsiteY12" fmla="*/ 1439815 h 5892104"/>
-              <a:gd name="connsiteX13" fmla="*/ 4342745 w 4381009"/>
-              <a:gd name="connsiteY13" fmla="*/ 1574812 h 5892104"/>
-              <a:gd name="connsiteX14" fmla="*/ 4350115 w 4381009"/>
-              <a:gd name="connsiteY14" fmla="*/ 1709808 h 5892104"/>
-              <a:gd name="connsiteX15" fmla="*/ 4357799 w 4381009"/>
-              <a:gd name="connsiteY15" fmla="*/ 1844200 h 5892104"/>
-              <a:gd name="connsiteX16" fmla="*/ 4364229 w 4381009"/>
-              <a:gd name="connsiteY16" fmla="*/ 1977381 h 5892104"/>
-              <a:gd name="connsiteX17" fmla="*/ 4368777 w 4381009"/>
-              <a:gd name="connsiteY17" fmla="*/ 2109351 h 5892104"/>
-              <a:gd name="connsiteX18" fmla="*/ 4372697 w 4381009"/>
-              <a:gd name="connsiteY18" fmla="*/ 2241321 h 5892104"/>
-              <a:gd name="connsiteX19" fmla="*/ 4376461 w 4381009"/>
-              <a:gd name="connsiteY19" fmla="*/ 2372080 h 5892104"/>
-              <a:gd name="connsiteX20" fmla="*/ 4378186 w 4381009"/>
-              <a:gd name="connsiteY20" fmla="*/ 2501023 h 5892104"/>
-              <a:gd name="connsiteX21" fmla="*/ 4380068 w 4381009"/>
-              <a:gd name="connsiteY21" fmla="*/ 2629966 h 5892104"/>
-              <a:gd name="connsiteX22" fmla="*/ 4381009 w 4381009"/>
-              <a:gd name="connsiteY22" fmla="*/ 2757093 h 5892104"/>
-              <a:gd name="connsiteX23" fmla="*/ 4380068 w 4381009"/>
-              <a:gd name="connsiteY23" fmla="*/ 2883010 h 5892104"/>
-              <a:gd name="connsiteX24" fmla="*/ 4380068 w 4381009"/>
-              <a:gd name="connsiteY24" fmla="*/ 3007715 h 5892104"/>
-              <a:gd name="connsiteX25" fmla="*/ 4378186 w 4381009"/>
-              <a:gd name="connsiteY25" fmla="*/ 3131210 h 5892104"/>
-              <a:gd name="connsiteX26" fmla="*/ 4375363 w 4381009"/>
-              <a:gd name="connsiteY26" fmla="*/ 3252283 h 5892104"/>
-              <a:gd name="connsiteX27" fmla="*/ 4372697 w 4381009"/>
-              <a:gd name="connsiteY27" fmla="*/ 3372146 h 5892104"/>
-              <a:gd name="connsiteX28" fmla="*/ 4369718 w 4381009"/>
-              <a:gd name="connsiteY28" fmla="*/ 3489587 h 5892104"/>
-              <a:gd name="connsiteX29" fmla="*/ 4365170 w 4381009"/>
-              <a:gd name="connsiteY29" fmla="*/ 3606423 h 5892104"/>
-              <a:gd name="connsiteX30" fmla="*/ 4360309 w 4381009"/>
-              <a:gd name="connsiteY30" fmla="*/ 3721443 h 5892104"/>
-              <a:gd name="connsiteX31" fmla="*/ 4355918 w 4381009"/>
-              <a:gd name="connsiteY31" fmla="*/ 3834041 h 5892104"/>
-              <a:gd name="connsiteX32" fmla="*/ 4343529 w 4381009"/>
-              <a:gd name="connsiteY32" fmla="*/ 4053789 h 5892104"/>
-              <a:gd name="connsiteX33" fmla="*/ 4330356 w 4381009"/>
-              <a:gd name="connsiteY33" fmla="*/ 4264457 h 5892104"/>
-              <a:gd name="connsiteX34" fmla="*/ 4316556 w 4381009"/>
-              <a:gd name="connsiteY34" fmla="*/ 4466650 h 5892104"/>
-              <a:gd name="connsiteX35" fmla="*/ 4301344 w 4381009"/>
-              <a:gd name="connsiteY35" fmla="*/ 4657946 h 5892104"/>
-              <a:gd name="connsiteX36" fmla="*/ 4285506 w 4381009"/>
-              <a:gd name="connsiteY36" fmla="*/ 4840767 h 5892104"/>
-              <a:gd name="connsiteX37" fmla="*/ 4268412 w 4381009"/>
-              <a:gd name="connsiteY37" fmla="*/ 5010269 h 5892104"/>
-              <a:gd name="connsiteX38" fmla="*/ 4251633 w 4381009"/>
-              <a:gd name="connsiteY38" fmla="*/ 5169481 h 5892104"/>
-              <a:gd name="connsiteX39" fmla="*/ 4234853 w 4381009"/>
-              <a:gd name="connsiteY39" fmla="*/ 5315980 h 5892104"/>
-              <a:gd name="connsiteX40" fmla="*/ 4219014 w 4381009"/>
-              <a:gd name="connsiteY40" fmla="*/ 5450371 h 5892104"/>
-              <a:gd name="connsiteX41" fmla="*/ 4203959 w 4381009"/>
-              <a:gd name="connsiteY41" fmla="*/ 5569628 h 5892104"/>
-              <a:gd name="connsiteX42" fmla="*/ 4189689 w 4381009"/>
-              <a:gd name="connsiteY42" fmla="*/ 5677384 h 5892104"/>
-              <a:gd name="connsiteX43" fmla="*/ 4177770 w 4381009"/>
-              <a:gd name="connsiteY43" fmla="*/ 5768189 h 5892104"/>
-              <a:gd name="connsiteX44" fmla="*/ 4166479 w 4381009"/>
-              <a:gd name="connsiteY44" fmla="*/ 5844465 h 5892104"/>
-              <a:gd name="connsiteX45" fmla="*/ 4159132 w 4381009"/>
-              <a:gd name="connsiteY45" fmla="*/ 5892104 h 5892104"/>
-              <a:gd name="connsiteX46" fmla="*/ 0 w 4381009"/>
-              <a:gd name="connsiteY46" fmla="*/ 5892104 h 5892104"/>
-            </a:gdLst>
-            <a:ahLst/>
-            <a:cxnLst>
-              <a:cxn ang="0">
-                <a:pos x="connsiteX0" y="connsiteY0"/>
-              </a:cxn>
-              <a:cxn ang="0">
-                <a:pos x="connsiteX1" y="connsiteY1"/>
-              </a:cxn>
-              <a:cxn ang="0">
-                <a:pos x="connsiteX2" y="connsiteY2"/>
-              </a:cxn>
-              <a:cxn ang="0">
-                <a:pos x="connsiteX3" y="connsiteY3"/>
-              </a:cxn>
-              <a:cxn ang="0">
-                <a:pos x="connsiteX4" y="connsiteY4"/>
-              </a:cxn>
-              <a:cxn ang="0">
-                <a:pos x="connsiteX5" y="connsiteY5"/>
-              </a:cxn>
-              <a:cxn ang="0">
-                <a:pos x="connsiteX6" y="connsiteY6"/>
-              </a:cxn>
-              <a:cxn ang="0">
-                <a:pos x="connsiteX7" y="connsiteY7"/>
-              </a:cxn>
-              <a:cxn ang="0">
-                <a:pos x="connsiteX8" y="connsiteY8"/>
-              </a:cxn>
-              <a:cxn ang="0">
-                <a:pos x="connsiteX9" y="connsiteY9"/>
-              </a:cxn>
-              <a:cxn ang="0">
-                <a:pos x="connsiteX10" y="connsiteY10"/>
-              </a:cxn>
-              <a:cxn ang="0">
-                <a:pos x="connsiteX11" y="connsiteY11"/>
-              </a:cxn>
-              <a:cxn ang="0">
-                <a:pos x="connsiteX12" y="connsiteY12"/>
-              </a:cxn>
-              <a:cxn ang="0">
-                <a:pos x="connsiteX13" y="connsiteY13"/>
-              </a:cxn>
-              <a:cxn ang="0">
-                <a:pos x="connsiteX14" y="connsiteY14"/>
-              </a:cxn>
-              <a:cxn ang="0">
-                <a:pos x="connsiteX15" y="connsiteY15"/>
-              </a:cxn>
-              <a:cxn ang="0">
-                <a:pos x="connsiteX16" y="connsiteY16"/>
-              </a:cxn>
-              <a:cxn ang="0">
-                <a:pos x="connsiteX17" y="connsiteY17"/>
-              </a:cxn>
-              <a:cxn ang="0">
-                <a:pos x="connsiteX18" y="connsiteY18"/>
-              </a:cxn>
-              <a:cxn ang="0">
-                <a:pos x="connsiteX19" y="connsiteY19"/>
-              </a:cxn>
-              <a:cxn ang="0">
-                <a:pos x="connsiteX20" y="connsiteY20"/>
-              </a:cxn>
-              <a:cxn ang="0">
-                <a:pos x="connsiteX21" y="connsiteY21"/>
-              </a:cxn>
-              <a:cxn ang="0">
-                <a:pos x="connsiteX22" y="connsiteY22"/>
-              </a:cxn>
-              <a:cxn ang="0">
-                <a:pos x="connsiteX23" y="connsiteY23"/>
-              </a:cxn>
-              <a:cxn ang="0">
-                <a:pos x="connsiteX24" y="connsiteY24"/>
-              </a:cxn>
-              <a:cxn ang="0">
-                <a:pos x="connsiteX25" y="connsiteY25"/>
-              </a:cxn>
-              <a:cxn ang="0">
-                <a:pos x="connsiteX26" y="connsiteY26"/>
-              </a:cxn>
-              <a:cxn ang="0">
-                <a:pos x="connsiteX27" y="connsiteY27"/>
-              </a:cxn>
-              <a:cxn ang="0">
-                <a:pos x="connsiteX28" y="connsiteY28"/>
-              </a:cxn>
-              <a:cxn ang="0">
-                <a:pos x="connsiteX29" y="connsiteY29"/>
-              </a:cxn>
-              <a:cxn ang="0">
-                <a:pos x="connsiteX30" y="connsiteY30"/>
-              </a:cxn>
-              <a:cxn ang="0">
-                <a:pos x="connsiteX31" y="connsiteY31"/>
-              </a:cxn>
-              <a:cxn ang="0">
-                <a:pos x="connsiteX32" y="connsiteY32"/>
-              </a:cxn>
-              <a:cxn ang="0">
-                <a:pos x="connsiteX33" y="connsiteY33"/>
-              </a:cxn>
-              <a:cxn ang="0">
-                <a:pos x="connsiteX34" y="connsiteY34"/>
-              </a:cxn>
-              <a:cxn ang="0">
-                <a:pos x="connsiteX35" y="connsiteY35"/>
-              </a:cxn>
-              <a:cxn ang="0">
-                <a:pos x="connsiteX36" y="connsiteY36"/>
-              </a:cxn>
-              <a:cxn ang="0">
-                <a:pos x="connsiteX37" y="connsiteY37"/>
-              </a:cxn>
-              <a:cxn ang="0">
-                <a:pos x="connsiteX38" y="connsiteY38"/>
-              </a:cxn>
-              <a:cxn ang="0">
-                <a:pos x="connsiteX39" y="connsiteY39"/>
-              </a:cxn>
-              <a:cxn ang="0">
-                <a:pos x="connsiteX40" y="connsiteY40"/>
-              </a:cxn>
-              <a:cxn ang="0">
-                <a:pos x="connsiteX41" y="connsiteY41"/>
-              </a:cxn>
-              <a:cxn ang="0">
-                <a:pos x="connsiteX42" y="connsiteY42"/>
-              </a:cxn>
-              <a:cxn ang="0">
-                <a:pos x="connsiteX43" y="connsiteY43"/>
-              </a:cxn>
-              <a:cxn ang="0">
-                <a:pos x="connsiteX44" y="connsiteY44"/>
-              </a:cxn>
-              <a:cxn ang="0">
-                <a:pos x="connsiteX45" y="connsiteY45"/>
-              </a:cxn>
-              <a:cxn ang="0">
-                <a:pos x="connsiteX46" y="connsiteY46"/>
-              </a:cxn>
-            </a:cxnLst>
-            <a:rect l="l" t="t" r="r" b="b"/>
-            <a:pathLst>
-              <a:path w="4381009" h="5892104">
-                <a:moveTo>
-                  <a:pt x="0" y="0"/>
-                </a:moveTo>
-                <a:lnTo>
-                  <a:pt x="4157628" y="0"/>
-                </a:lnTo>
-                <a:lnTo>
-                  <a:pt x="4169302" y="68659"/>
-                </a:lnTo>
-                <a:lnTo>
-                  <a:pt x="4191571" y="205472"/>
-                </a:lnTo>
-                <a:lnTo>
-                  <a:pt x="4213368" y="342890"/>
-                </a:lnTo>
-                <a:lnTo>
-                  <a:pt x="4232030" y="480913"/>
-                </a:lnTo>
-                <a:lnTo>
-                  <a:pt x="4250848" y="618332"/>
-                </a:lnTo>
-                <a:lnTo>
-                  <a:pt x="4268412" y="756355"/>
-                </a:lnTo>
-                <a:lnTo>
-                  <a:pt x="4283467" y="892563"/>
-                </a:lnTo>
-                <a:lnTo>
-                  <a:pt x="4297737" y="1030587"/>
-                </a:lnTo>
-                <a:lnTo>
-                  <a:pt x="4310754" y="1168005"/>
-                </a:lnTo>
-                <a:lnTo>
-                  <a:pt x="4322045" y="1303002"/>
-                </a:lnTo>
-                <a:lnTo>
-                  <a:pt x="4333336" y="1439815"/>
-                </a:lnTo>
-                <a:lnTo>
-                  <a:pt x="4342745" y="1574812"/>
-                </a:lnTo>
-                <a:lnTo>
-                  <a:pt x="4350115" y="1709808"/>
-                </a:lnTo>
-                <a:lnTo>
-                  <a:pt x="4357799" y="1844200"/>
-                </a:lnTo>
-                <a:lnTo>
-                  <a:pt x="4364229" y="1977381"/>
-                </a:lnTo>
-                <a:lnTo>
-                  <a:pt x="4368777" y="2109351"/>
-                </a:lnTo>
-                <a:lnTo>
-                  <a:pt x="4372697" y="2241321"/>
-                </a:lnTo>
-                <a:lnTo>
-                  <a:pt x="4376461" y="2372080"/>
-                </a:lnTo>
-                <a:lnTo>
-                  <a:pt x="4378186" y="2501023"/>
-                </a:lnTo>
-                <a:lnTo>
-                  <a:pt x="4380068" y="2629966"/>
-                </a:lnTo>
-                <a:lnTo>
-                  <a:pt x="4381009" y="2757093"/>
-                </a:lnTo>
-                <a:lnTo>
-                  <a:pt x="4380068" y="2883010"/>
-                </a:lnTo>
-                <a:lnTo>
-                  <a:pt x="4380068" y="3007715"/>
-                </a:lnTo>
-                <a:lnTo>
-                  <a:pt x="4378186" y="3131210"/>
-                </a:lnTo>
-                <a:lnTo>
-                  <a:pt x="4375363" y="3252283"/>
-                </a:lnTo>
-                <a:lnTo>
-                  <a:pt x="4372697" y="3372146"/>
-                </a:lnTo>
-                <a:lnTo>
-                  <a:pt x="4369718" y="3489587"/>
-                </a:lnTo>
-                <a:lnTo>
-                  <a:pt x="4365170" y="3606423"/>
-                </a:lnTo>
-                <a:lnTo>
-                  <a:pt x="4360309" y="3721443"/>
-                </a:lnTo>
-                <a:lnTo>
-                  <a:pt x="4355918" y="3834041"/>
-                </a:lnTo>
-                <a:lnTo>
-                  <a:pt x="4343529" y="4053789"/>
-                </a:lnTo>
-                <a:lnTo>
-                  <a:pt x="4330356" y="4264457"/>
-                </a:lnTo>
-                <a:lnTo>
-                  <a:pt x="4316556" y="4466650"/>
-                </a:lnTo>
-                <a:lnTo>
-                  <a:pt x="4301344" y="4657946"/>
-                </a:lnTo>
-                <a:lnTo>
-                  <a:pt x="4285506" y="4840767"/>
-                </a:lnTo>
-                <a:lnTo>
-                  <a:pt x="4268412" y="5010269"/>
-                </a:lnTo>
-                <a:lnTo>
-                  <a:pt x="4251633" y="5169481"/>
-                </a:lnTo>
-                <a:lnTo>
-                  <a:pt x="4234853" y="5315980"/>
-                </a:lnTo>
-                <a:lnTo>
-                  <a:pt x="4219014" y="5450371"/>
-                </a:lnTo>
-                <a:lnTo>
-                  <a:pt x="4203959" y="5569628"/>
-                </a:lnTo>
-                <a:lnTo>
-                  <a:pt x="4189689" y="5677384"/>
-                </a:lnTo>
-                <a:lnTo>
-                  <a:pt x="4177770" y="5768189"/>
-                </a:lnTo>
-                <a:lnTo>
-                  <a:pt x="4166479" y="5844465"/>
-                </a:lnTo>
-                <a:lnTo>
-                  <a:pt x="4159132" y="5892104"/>
-                </a:lnTo>
-                <a:lnTo>
-                  <a:pt x="0" y="5892104"/>
-                </a:lnTo>
-                <a:close/>
-              </a:path>
-            </a:pathLst>
-          </a:custGeom>
-          <a:solidFill>
-            <a:srgbClr val="404040"/>
-          </a:solidFill>
-          <a:ln>
-            <a:noFill/>
-          </a:ln>
-        </p:spPr>
-        <p:style>
-          <a:lnRef idx="2">
-            <a:schemeClr val="accent1">
-              <a:shade val="50000"/>
-            </a:schemeClr>
-          </a:lnRef>
-          <a:fillRef idx="1">
-            <a:schemeClr val="accent1"/>
-          </a:fillRef>
-          <a:effectRef idx="0">
-            <a:schemeClr val="accent1"/>
-          </a:effectRef>
-          <a:fontRef idx="minor">
-            <a:schemeClr val="lt1"/>
-          </a:fontRef>
-        </p:style>
-        <p:txBody>
-          <a:bodyPr wrap="square" rtlCol="0" anchor="ctr">
-            <a:noAutofit/>
-          </a:bodyPr>
-          <a:lstStyle/>
-          <a:p>
-            <a:pPr marL="0" marR="0" lvl="0" indent="0" algn="ctr" defTabSz="457200" rtl="0" eaLnBrk="1" fontAlgn="auto" latinLnBrk="0" hangingPunct="1">
-              <a:lnSpc>
-                <a:spcPct val="100000"/>
-              </a:lnSpc>
-              <a:spcBef>
-                <a:spcPts val="0"/>
-              </a:spcBef>
-              <a:spcAft>
-                <a:spcPts val="0"/>
-              </a:spcAft>
-              <a:buClrTx/>
-              <a:buSzTx/>
-              <a:buFontTx/>
-              <a:buNone/>
-              <a:tabLst/>
-              <a:defRPr/>
-            </a:pPr>
-            <a:endParaRPr kumimoji="0" lang="en-US" sz="1800" b="0" i="0" u="none" strike="noStrike" kern="1200" cap="none" spc="0" normalizeH="0" baseline="0" noProof="0">
-              <a:ln>
-                <a:noFill/>
-              </a:ln>
-              <a:solidFill>
-                <a:prstClr val="white"/>
-              </a:solidFill>
-              <a:effectLst/>
-              <a:uLnTx/>
-              <a:uFillTx/>
-              <a:latin typeface="Calibri" panose="020F0502020204030204"/>
-              <a:ea typeface="+mn-ea"/>
-              <a:cs typeface="+mn-cs"/>
-            </a:endParaRPr>
-          </a:p>
-        </p:txBody>
-      </p:sp>
-      <p:sp>
-        <p:nvSpPr>
-          <p:cNvPr id="2" name="Titel 1">
-            <a:extLst>
-              <a:ext uri="{FF2B5EF4-FFF2-40B4-BE49-F238E27FC236}">
-                <a16:creationId xmlns:a16="http://schemas.microsoft.com/office/drawing/2014/main" id="{80747543-2235-43C6-9481-9128DD1CA507}"/>
-              </a:ext>
-            </a:extLst>
-          </p:cNvPr>
-          <p:cNvSpPr>
-            <a:spLocks noGrp="1"/>
-          </p:cNvSpPr>
-          <p:nvPr>
-            <p:ph type="title"/>
-          </p:nvPr>
-        </p:nvSpPr>
-        <p:spPr>
-          <a:xfrm>
-            <a:off x="863029" y="1012004"/>
-            <a:ext cx="3416158" cy="4795408"/>
-          </a:xfrm>
-        </p:spPr>
-        <p:txBody>
-          <a:bodyPr>
-            <a:normAutofit/>
-          </a:bodyPr>
-          <a:lstStyle/>
-          <a:p>
-            <a:r>
-              <a:rPr lang="de-DE">
-                <a:solidFill>
-                  <a:srgbClr val="FFFFFF"/>
-                </a:solidFill>
-              </a:rPr>
-              <a:t>Reflexion</a:t>
-            </a:r>
-          </a:p>
-        </p:txBody>
-      </p:sp>
-      <p:graphicFrame>
-        <p:nvGraphicFramePr>
-          <p:cNvPr id="5" name="Inhaltsplatzhalter 2">
-            <a:extLst>
-              <a:ext uri="{FF2B5EF4-FFF2-40B4-BE49-F238E27FC236}">
-                <a16:creationId xmlns:a16="http://schemas.microsoft.com/office/drawing/2014/main" id="{C5826FEA-AF69-4E04-8470-9CD18D791994}"/>
-              </a:ext>
-            </a:extLst>
-          </p:cNvPr>
-          <p:cNvGraphicFramePr>
-            <a:graphicFrameLocks noGrp="1"/>
-          </p:cNvGraphicFramePr>
-          <p:nvPr>
-            <p:ph idx="1"/>
-            <p:extLst>
-              <p:ext uri="{D42A27DB-BD31-4B8C-83A1-F6EECF244321}">
-                <p14:modId xmlns:p14="http://schemas.microsoft.com/office/powerpoint/2010/main" val="2924052128"/>
-              </p:ext>
-            </p:extLst>
-          </p:nvPr>
-        </p:nvGraphicFramePr>
-        <p:xfrm>
-          <a:off x="5194300" y="470924"/>
-          <a:ext cx="6513604" cy="5885426"/>
-        </p:xfrm>
-        <a:graphic>
-          <a:graphicData uri="http://schemas.openxmlformats.org/drawingml/2006/diagram">
-            <dgm:relIds xmlns:dgm="http://schemas.openxmlformats.org/drawingml/2006/diagram" xmlns:r="http://schemas.openxmlformats.org/officeDocument/2006/relationships" r:dm="rId2" r:lo="rId3" r:qs="rId4" r:cs="rId5"/>
-          </a:graphicData>
-        </a:graphic>
-      </p:graphicFrame>
-    </p:spTree>
-    <p:extLst>
-      <p:ext uri="{BB962C8B-B14F-4D97-AF65-F5344CB8AC3E}">
-        <p14:creationId xmlns:p14="http://schemas.microsoft.com/office/powerpoint/2010/main" val="511304633"/>
-      </p:ext>
-    </p:extLst>
-  </p:cSld>
-  <p:clrMapOvr>
-    <a:masterClrMapping/>
-  </p:clrMapOvr>
-</p:sld>
-</file>
-
-<file path=ppt/slides/slide8.xml><?xml version="1.0" encoding="utf-8"?>
-<p:sld xmlns:a="http://schemas.openxmlformats.org/drawingml/2006/main" xmlns:r="http://schemas.openxmlformats.org/officeDocument/2006/relationships" xmlns:p="http://schemas.openxmlformats.org/presentationml/2006/main">
-  <p:cSld>
-    <p:bg>
-      <p:bgPr>
-        <a:solidFill>
-          <a:schemeClr val="bg1"/>
-        </a:solidFill>
-        <a:effectLst/>
-      </p:bgPr>
-    </p:bg>
-    <p:spTree>
-      <p:nvGrpSpPr>
-        <p:cNvPr id="1" name=""/>
-        <p:cNvGrpSpPr/>
-        <p:nvPr/>
-      </p:nvGrpSpPr>
-      <p:grpSpPr>
-        <a:xfrm>
-          <a:off x="0" y="0"/>
-          <a:ext cx="0" cy="0"/>
-          <a:chOff x="0" y="0"/>
-          <a:chExt cx="0" cy="0"/>
-        </a:xfrm>
-      </p:grpSpPr>
-      <p:sp>
-        <p:nvSpPr>
-          <p:cNvPr id="10" name="Rectangle 9">
-            <a:extLst>
-              <a:ext uri="{FF2B5EF4-FFF2-40B4-BE49-F238E27FC236}">
-                <a16:creationId xmlns:a16="http://schemas.microsoft.com/office/drawing/2014/main" id="{823AC064-BC96-4F32-8AE1-B2FD38754823}"/>
-              </a:ext>
-              <a:ext uri="{C183D7F6-B498-43B3-948B-1728B52AA6E4}">
-                <adec:decorative xmlns:adec="http://schemas.microsoft.com/office/drawing/2017/decorative" val="1"/>
-              </a:ext>
-            </a:extLst>
-          </p:cNvPr>
-          <p:cNvSpPr>
-            <a:spLocks noGrp="1" noRot="1" noChangeAspect="1" noMove="1" noResize="1" noEditPoints="1" noAdjustHandles="1" noChangeArrowheads="1" noChangeShapeType="1" noTextEdit="1"/>
-          </p:cNvSpPr>
-          <p:nvPr>
-            <p:extLst>
-              <p:ext uri="{386F3935-93C4-4BCD-93E2-E3B085C9AB24}">
-                <p16:designElem xmlns:p16="http://schemas.microsoft.com/office/powerpoint/2015/main" val="1"/>
-              </p:ext>
-            </p:extLst>
-          </p:nvPr>
-        </p:nvSpPr>
-        <p:spPr bwMode="ltGray">
-          <a:xfrm>
-            <a:off x="378068" y="343486"/>
-            <a:ext cx="11438793" cy="1844256"/>
-          </a:xfrm>
-          <a:prstGeom prst="rect">
-            <a:avLst/>
-          </a:prstGeom>
-          <a:solidFill>
-            <a:srgbClr val="404040"/>
-          </a:solidFill>
-          <a:ln w="127000" cap="sq" cmpd="thinThick">
-            <a:solidFill>
-              <a:srgbClr val="404040"/>
-            </a:solidFill>
-          </a:ln>
-        </p:spPr>
-        <p:style>
-          <a:lnRef idx="2">
-            <a:schemeClr val="accent1">
-              <a:shade val="50000"/>
-            </a:schemeClr>
-          </a:lnRef>
-          <a:fillRef idx="1">
-            <a:schemeClr val="accent1"/>
-          </a:fillRef>
-          <a:effectRef idx="0">
-            <a:schemeClr val="accent1"/>
-          </a:effectRef>
-          <a:fontRef idx="minor">
-            <a:schemeClr val="lt1"/>
-          </a:fontRef>
-        </p:style>
-        <p:txBody>
-          <a:bodyPr rtlCol="0" anchor="ctr"/>
-          <a:lstStyle/>
-          <a:p>
-            <a:pPr marL="0" marR="0" lvl="0" indent="0" algn="ctr" defTabSz="914400" rtl="0" eaLnBrk="1" fontAlgn="auto" latinLnBrk="0" hangingPunct="1">
-              <a:lnSpc>
-                <a:spcPct val="100000"/>
-              </a:lnSpc>
-              <a:spcBef>
-                <a:spcPts val="0"/>
-              </a:spcBef>
-              <a:spcAft>
-                <a:spcPts val="0"/>
-              </a:spcAft>
-              <a:buClrTx/>
-              <a:buSzTx/>
-              <a:buFontTx/>
-              <a:buNone/>
-              <a:tabLst/>
-              <a:defRPr/>
-            </a:pPr>
-            <a:endParaRPr kumimoji="0" lang="en-US" sz="1800" b="0" i="0" u="none" strike="noStrike" kern="1200" cap="none" spc="0" normalizeH="0" baseline="0" noProof="0">
-              <a:ln>
-                <a:noFill/>
-              </a:ln>
-              <a:solidFill>
-                <a:prstClr val="white"/>
-              </a:solidFill>
-              <a:effectLst/>
-              <a:uLnTx/>
-              <a:uFillTx/>
-              <a:latin typeface="Calibri" panose="020F0502020204030204"/>
-              <a:ea typeface="+mn-ea"/>
-              <a:cs typeface="+mn-cs"/>
-            </a:endParaRPr>
-          </a:p>
-        </p:txBody>
-      </p:sp>
-      <p:sp>
-        <p:nvSpPr>
-          <p:cNvPr id="2" name="Titel 1">
-            <a:extLst>
-              <a:ext uri="{FF2B5EF4-FFF2-40B4-BE49-F238E27FC236}">
-                <a16:creationId xmlns:a16="http://schemas.microsoft.com/office/drawing/2014/main" id="{8B091153-A6EC-4181-8FEF-0EBC2035DE73}"/>
-              </a:ext>
-            </a:extLst>
-          </p:cNvPr>
-          <p:cNvSpPr>
-            <a:spLocks noGrp="1"/>
-          </p:cNvSpPr>
-          <p:nvPr>
-            <p:ph type="title"/>
-          </p:nvPr>
-        </p:nvSpPr>
-        <p:spPr>
-          <a:xfrm>
-            <a:off x="526073" y="466578"/>
-            <a:ext cx="11139854" cy="930447"/>
-          </a:xfrm>
-        </p:spPr>
-        <p:txBody>
-          <a:bodyPr vert="horz" lIns="91440" tIns="45720" rIns="91440" bIns="45720" rtlCol="0" anchor="b">
-            <a:normAutofit/>
-          </a:bodyPr>
-          <a:lstStyle/>
-          <a:p>
-            <a:pPr algn="ctr"/>
-            <a:r>
-              <a:rPr lang="en-US" sz="5400" kern="1200">
-                <a:solidFill>
-                  <a:srgbClr val="FFFFFF"/>
-                </a:solidFill>
-                <a:latin typeface="+mj-lt"/>
-                <a:ea typeface="+mj-ea"/>
-                <a:cs typeface="+mj-cs"/>
-              </a:rPr>
-              <a:t>Fragen?</a:t>
-            </a:r>
-          </a:p>
-        </p:txBody>
-      </p:sp>
-      <p:sp>
-        <p:nvSpPr>
-          <p:cNvPr id="3" name="Inhaltsplatzhalter 2">
-            <a:extLst>
-              <a:ext uri="{FF2B5EF4-FFF2-40B4-BE49-F238E27FC236}">
-                <a16:creationId xmlns:a16="http://schemas.microsoft.com/office/drawing/2014/main" id="{0EC1D7BD-9C2B-4612-942D-FBC9EA4A05A9}"/>
-              </a:ext>
-            </a:extLst>
-          </p:cNvPr>
-          <p:cNvSpPr>
-            <a:spLocks noGrp="1"/>
-          </p:cNvSpPr>
-          <p:nvPr>
-            <p:ph idx="1"/>
-          </p:nvPr>
-        </p:nvSpPr>
-        <p:spPr>
-          <a:xfrm>
-            <a:off x="1524000" y="1525638"/>
-            <a:ext cx="9144000" cy="420001"/>
-          </a:xfrm>
-        </p:spPr>
-        <p:txBody>
-          <a:bodyPr vert="horz" lIns="91440" tIns="45720" rIns="91440" bIns="45720" rtlCol="0">
-            <a:normAutofit/>
-          </a:bodyPr>
-          <a:lstStyle/>
-          <a:p>
-            <a:pPr marL="0" indent="0" algn="ctr">
-              <a:buNone/>
-            </a:pPr>
-            <a:r>
-              <a:rPr lang="en-US" sz="2000" kern="1200" dirty="0" err="1">
-                <a:solidFill>
-                  <a:srgbClr val="E7E6E6"/>
-                </a:solidFill>
-                <a:latin typeface="+mn-lt"/>
-                <a:ea typeface="+mn-ea"/>
-                <a:cs typeface="+mn-cs"/>
-              </a:rPr>
-              <a:t>Vielen</a:t>
-            </a:r>
-            <a:r>
-              <a:rPr lang="en-US" sz="2000" kern="1200" dirty="0">
-                <a:solidFill>
-                  <a:srgbClr val="E7E6E6"/>
-                </a:solidFill>
-                <a:latin typeface="+mn-lt"/>
-                <a:ea typeface="+mn-ea"/>
-                <a:cs typeface="+mn-cs"/>
-              </a:rPr>
-              <a:t> Dank </a:t>
-            </a:r>
-            <a:r>
-              <a:rPr lang="en-US" sz="2000" kern="1200" dirty="0" err="1">
-                <a:solidFill>
-                  <a:srgbClr val="E7E6E6"/>
-                </a:solidFill>
-                <a:latin typeface="+mn-lt"/>
-                <a:ea typeface="+mn-ea"/>
-                <a:cs typeface="+mn-cs"/>
-              </a:rPr>
-              <a:t>für</a:t>
-            </a:r>
-            <a:r>
-              <a:rPr lang="en-US" sz="2000" kern="1200" dirty="0">
-                <a:solidFill>
-                  <a:srgbClr val="E7E6E6"/>
-                </a:solidFill>
-                <a:latin typeface="+mn-lt"/>
-                <a:ea typeface="+mn-ea"/>
-                <a:cs typeface="+mn-cs"/>
-              </a:rPr>
-              <a:t> </a:t>
-            </a:r>
-            <a:r>
-              <a:rPr lang="en-US" sz="2000" kern="1200" dirty="0" err="1">
-                <a:solidFill>
-                  <a:srgbClr val="E7E6E6"/>
-                </a:solidFill>
-                <a:latin typeface="+mn-lt"/>
-                <a:ea typeface="+mn-ea"/>
-                <a:cs typeface="+mn-cs"/>
-              </a:rPr>
-              <a:t>Eure</a:t>
-            </a:r>
-            <a:r>
-              <a:rPr lang="en-US" sz="2000" kern="1200" dirty="0">
-                <a:solidFill>
-                  <a:srgbClr val="E7E6E6"/>
-                </a:solidFill>
-                <a:latin typeface="+mn-lt"/>
-                <a:ea typeface="+mn-ea"/>
-                <a:cs typeface="+mn-cs"/>
-              </a:rPr>
-              <a:t> </a:t>
-            </a:r>
-            <a:r>
-              <a:rPr lang="en-US" sz="2000" kern="1200" dirty="0" err="1">
-                <a:solidFill>
-                  <a:srgbClr val="E7E6E6"/>
-                </a:solidFill>
-                <a:latin typeface="+mn-lt"/>
-                <a:ea typeface="+mn-ea"/>
-                <a:cs typeface="+mn-cs"/>
-              </a:rPr>
-              <a:t>Aufmerksamkeit</a:t>
-            </a:r>
-            <a:r>
-              <a:rPr lang="en-US" sz="2000" kern="1200" dirty="0">
-                <a:solidFill>
-                  <a:srgbClr val="E7E6E6"/>
-                </a:solidFill>
-                <a:latin typeface="+mn-lt"/>
-                <a:ea typeface="+mn-ea"/>
-                <a:cs typeface="+mn-cs"/>
-              </a:rPr>
-              <a:t>!</a:t>
-            </a:r>
-          </a:p>
-        </p:txBody>
-      </p:sp>
-      <p:cxnSp>
-        <p:nvCxnSpPr>
-          <p:cNvPr id="12" name="Straight Connector 11">
-            <a:extLst>
-              <a:ext uri="{FF2B5EF4-FFF2-40B4-BE49-F238E27FC236}">
-                <a16:creationId xmlns:a16="http://schemas.microsoft.com/office/drawing/2014/main" id="{7E7C77BC-7138-40B1-A15B-20F57A494629}"/>
-              </a:ext>
-              <a:ext uri="{C183D7F6-B498-43B3-948B-1728B52AA6E4}">
-                <adec:decorative xmlns:adec="http://schemas.microsoft.com/office/drawing/2017/decorative" val="1"/>
-              </a:ext>
-            </a:extLst>
-          </p:cNvPr>
-          <p:cNvCxnSpPr>
-            <a:cxnSpLocks noGrp="1" noRot="1" noChangeAspect="1" noMove="1" noResize="1" noEditPoints="1" noAdjustHandles="1" noChangeArrowheads="1" noChangeShapeType="1"/>
-          </p:cNvCxnSpPr>
-          <p:nvPr>
-            <p:extLst>
-              <p:ext uri="{386F3935-93C4-4BCD-93E2-E3B085C9AB24}">
-                <p16:designElem xmlns:p16="http://schemas.microsoft.com/office/powerpoint/2015/main" val="1"/>
-              </p:ext>
-            </p:extLst>
-          </p:nvPr>
-        </p:nvCxnSpPr>
-        <p:spPr>
-          <a:xfrm>
-            <a:off x="2209800" y="1448631"/>
-            <a:ext cx="7772400" cy="0"/>
-          </a:xfrm>
-          <a:prstGeom prst="line">
-            <a:avLst/>
-          </a:prstGeom>
-          <a:ln w="22225">
-            <a:solidFill>
-              <a:srgbClr val="D9D9D9"/>
-            </a:solidFill>
-          </a:ln>
-        </p:spPr>
-        <p:style>
-          <a:lnRef idx="1">
-            <a:schemeClr val="accent1"/>
-          </a:lnRef>
-          <a:fillRef idx="0">
-            <a:schemeClr val="accent1"/>
-          </a:fillRef>
-          <a:effectRef idx="0">
-            <a:schemeClr val="accent1"/>
-          </a:effectRef>
-          <a:fontRef idx="minor">
-            <a:schemeClr val="tx1"/>
-          </a:fontRef>
-        </p:style>
-      </p:cxnSp>
-      <p:pic>
-        <p:nvPicPr>
-          <p:cNvPr id="7" name="Graphic 6">
-            <a:extLst>
-              <a:ext uri="{FF2B5EF4-FFF2-40B4-BE49-F238E27FC236}">
-                <a16:creationId xmlns:a16="http://schemas.microsoft.com/office/drawing/2014/main" id="{62CE27A7-0387-444E-82AD-9992707B5343}"/>
-              </a:ext>
-            </a:extLst>
-          </p:cNvPr>
-          <p:cNvPicPr>
-            <a:picLocks noChangeAspect="1"/>
-          </p:cNvPicPr>
-          <p:nvPr/>
-        </p:nvPicPr>
-        <p:blipFill>
-          <a:blip r:embed="rId2">
-            <a:extLst>
-              <a:ext uri="{28A0092B-C50C-407E-A947-70E740481C1C}">
-                <a14:useLocalDpi xmlns:a14="http://schemas.microsoft.com/office/drawing/2010/main" val="0"/>
-              </a:ext>
-              <a:ext uri="{96DAC541-7B7A-43D3-8B79-37D633B846F1}">
-                <asvg:svgBlip xmlns:asvg="http://schemas.microsoft.com/office/drawing/2016/SVG/main" r:embed="rId3"/>
-              </a:ext>
-            </a:extLst>
-          </a:blip>
-          <a:stretch>
-            <a:fillRect/>
-          </a:stretch>
-        </p:blipFill>
-        <p:spPr>
-          <a:xfrm>
-            <a:off x="4069632" y="2509911"/>
-            <a:ext cx="3997637" cy="3997637"/>
-          </a:xfrm>
-          <a:prstGeom prst="rect">
-            <a:avLst/>
-          </a:prstGeom>
-        </p:spPr>
-      </p:pic>
-    </p:spTree>
-    <p:extLst>
-      <p:ext uri="{BB962C8B-B14F-4D97-AF65-F5344CB8AC3E}">
-        <p14:creationId xmlns:p14="http://schemas.microsoft.com/office/powerpoint/2010/main" val="3850624701"/>
       </p:ext>
     </p:extLst>
   </p:cSld>

</xml_diff>